<commit_message>
updates on slides added a new slider property to the webpart
</commit_message>
<xml_diff>
--- a/slides/spfx para classic devs.pptx
+++ b/slides/spfx para classic devs.pptx
@@ -4,8 +4,17 @@
   <p:sldMasterIdLst>
     <p:sldMasterId id="2147483648" r:id="rId1"/>
   </p:sldMasterIdLst>
+  <p:notesMasterIdLst>
+    <p:notesMasterId r:id="rId9"/>
+  </p:notesMasterIdLst>
   <p:sldIdLst>
     <p:sldId id="256" r:id="rId2"/>
+    <p:sldId id="257" r:id="rId3"/>
+    <p:sldId id="258" r:id="rId4"/>
+    <p:sldId id="259" r:id="rId5"/>
+    <p:sldId id="260" r:id="rId6"/>
+    <p:sldId id="261" r:id="rId7"/>
+    <p:sldId id="262" r:id="rId8"/>
   </p:sldIdLst>
   <p:sldSz cx="12192000" cy="6858000"/>
   <p:notesSz cx="6858000" cy="9144000"/>
@@ -105,6 +114,440 @@
     </a:lvl9pPr>
   </p:defaultTextStyle>
 </p:presentation>
+</file>
+
+<file path=ppt/notesMasters/notesMaster1.xml><?xml version="1.0" encoding="utf-8"?>
+<p:notesMaster xmlns:a="http://schemas.openxmlformats.org/drawingml/2006/main" xmlns:r="http://schemas.openxmlformats.org/officeDocument/2006/relationships" xmlns:p="http://schemas.openxmlformats.org/presentationml/2006/main">
+  <p:cSld>
+    <p:bg>
+      <p:bgRef idx="1001">
+        <a:schemeClr val="bg1"/>
+      </p:bgRef>
+    </p:bg>
+    <p:spTree>
+      <p:nvGrpSpPr>
+        <p:cNvPr id="1" name=""/>
+        <p:cNvGrpSpPr/>
+        <p:nvPr/>
+      </p:nvGrpSpPr>
+      <p:grpSpPr>
+        <a:xfrm>
+          <a:off x="0" y="0"/>
+          <a:ext cx="0" cy="0"/>
+          <a:chOff x="0" y="0"/>
+          <a:chExt cx="0" cy="0"/>
+        </a:xfrm>
+      </p:grpSpPr>
+      <p:sp>
+        <p:nvSpPr>
+          <p:cNvPr id="2" name="Marcador de encabezado 1"/>
+          <p:cNvSpPr>
+            <a:spLocks noGrp="1"/>
+          </p:cNvSpPr>
+          <p:nvPr>
+            <p:ph type="hdr" sz="quarter"/>
+          </p:nvPr>
+        </p:nvSpPr>
+        <p:spPr>
+          <a:xfrm>
+            <a:off x="0" y="0"/>
+            <a:ext cx="2971800" cy="458788"/>
+          </a:xfrm>
+          <a:prstGeom prst="rect">
+            <a:avLst/>
+          </a:prstGeom>
+        </p:spPr>
+        <p:txBody>
+          <a:bodyPr vert="horz" lIns="91440" tIns="45720" rIns="91440" bIns="45720" rtlCol="0"/>
+          <a:lstStyle>
+            <a:lvl1pPr algn="l">
+              <a:defRPr sz="1200"/>
+            </a:lvl1pPr>
+          </a:lstStyle>
+          <a:p>
+            <a:endParaRPr lang="es-ES_tradnl"/>
+          </a:p>
+        </p:txBody>
+      </p:sp>
+      <p:sp>
+        <p:nvSpPr>
+          <p:cNvPr id="3" name="Marcador de fecha 2"/>
+          <p:cNvSpPr>
+            <a:spLocks noGrp="1"/>
+          </p:cNvSpPr>
+          <p:nvPr>
+            <p:ph type="dt" idx="1"/>
+          </p:nvPr>
+        </p:nvSpPr>
+        <p:spPr>
+          <a:xfrm>
+            <a:off x="3884613" y="0"/>
+            <a:ext cx="2971800" cy="458788"/>
+          </a:xfrm>
+          <a:prstGeom prst="rect">
+            <a:avLst/>
+          </a:prstGeom>
+        </p:spPr>
+        <p:txBody>
+          <a:bodyPr vert="horz" lIns="91440" tIns="45720" rIns="91440" bIns="45720" rtlCol="0"/>
+          <a:lstStyle>
+            <a:lvl1pPr algn="r">
+              <a:defRPr sz="1200"/>
+            </a:lvl1pPr>
+          </a:lstStyle>
+          <a:p>
+            <a:fld id="{746FE1C3-8C7D-2B4E-B272-A6D7E4750750}" type="datetimeFigureOut">
+              <a:rPr lang="es-ES_tradnl" smtClean="0"/>
+              <a:t>12/10/17</a:t>
+            </a:fld>
+            <a:endParaRPr lang="es-ES_tradnl"/>
+          </a:p>
+        </p:txBody>
+      </p:sp>
+      <p:sp>
+        <p:nvSpPr>
+          <p:cNvPr id="4" name="Marcador de imagen de diapositiva 3"/>
+          <p:cNvSpPr>
+            <a:spLocks noGrp="1" noRot="1" noChangeAspect="1"/>
+          </p:cNvSpPr>
+          <p:nvPr>
+            <p:ph type="sldImg" idx="2"/>
+          </p:nvPr>
+        </p:nvSpPr>
+        <p:spPr>
+          <a:xfrm>
+            <a:off x="685800" y="1143000"/>
+            <a:ext cx="5486400" cy="3086100"/>
+          </a:xfrm>
+          <a:prstGeom prst="rect">
+            <a:avLst/>
+          </a:prstGeom>
+          <a:noFill/>
+          <a:ln w="12700">
+            <a:solidFill>
+              <a:prstClr val="black"/>
+            </a:solidFill>
+          </a:ln>
+        </p:spPr>
+        <p:txBody>
+          <a:bodyPr vert="horz" lIns="91440" tIns="45720" rIns="91440" bIns="45720" rtlCol="0" anchor="ctr"/>
+          <a:lstStyle/>
+          <a:p>
+            <a:endParaRPr lang="es-ES_tradnl"/>
+          </a:p>
+        </p:txBody>
+      </p:sp>
+      <p:sp>
+        <p:nvSpPr>
+          <p:cNvPr id="5" name="Marcador de notas 4"/>
+          <p:cNvSpPr>
+            <a:spLocks noGrp="1"/>
+          </p:cNvSpPr>
+          <p:nvPr>
+            <p:ph type="body" sz="quarter" idx="3"/>
+          </p:nvPr>
+        </p:nvSpPr>
+        <p:spPr>
+          <a:xfrm>
+            <a:off x="685800" y="4400550"/>
+            <a:ext cx="5486400" cy="3600450"/>
+          </a:xfrm>
+          <a:prstGeom prst="rect">
+            <a:avLst/>
+          </a:prstGeom>
+        </p:spPr>
+        <p:txBody>
+          <a:bodyPr vert="horz" lIns="91440" tIns="45720" rIns="91440" bIns="45720" rtlCol="0"/>
+          <a:lstStyle/>
+          <a:p>
+            <a:pPr lvl="0"/>
+            <a:r>
+              <a:rPr lang="es-ES_tradnl" smtClean="0"/>
+              <a:t>Haga clic para modificar los estilos de texto del patrón</a:t>
+            </a:r>
+          </a:p>
+          <a:p>
+            <a:pPr lvl="1"/>
+            <a:r>
+              <a:rPr lang="es-ES_tradnl" smtClean="0"/>
+              <a:t>Segundo nivel</a:t>
+            </a:r>
+          </a:p>
+          <a:p>
+            <a:pPr lvl="2"/>
+            <a:r>
+              <a:rPr lang="es-ES_tradnl" smtClean="0"/>
+              <a:t>Tercer nivel</a:t>
+            </a:r>
+          </a:p>
+          <a:p>
+            <a:pPr lvl="3"/>
+            <a:r>
+              <a:rPr lang="es-ES_tradnl" smtClean="0"/>
+              <a:t>Cuarto nivel</a:t>
+            </a:r>
+          </a:p>
+          <a:p>
+            <a:pPr lvl="4"/>
+            <a:r>
+              <a:rPr lang="es-ES_tradnl" smtClean="0"/>
+              <a:t>Quinto nivel</a:t>
+            </a:r>
+            <a:endParaRPr lang="es-ES_tradnl"/>
+          </a:p>
+        </p:txBody>
+      </p:sp>
+      <p:sp>
+        <p:nvSpPr>
+          <p:cNvPr id="6" name="Marcador de pie de página 5"/>
+          <p:cNvSpPr>
+            <a:spLocks noGrp="1"/>
+          </p:cNvSpPr>
+          <p:nvPr>
+            <p:ph type="ftr" sz="quarter" idx="4"/>
+          </p:nvPr>
+        </p:nvSpPr>
+        <p:spPr>
+          <a:xfrm>
+            <a:off x="0" y="8685213"/>
+            <a:ext cx="2971800" cy="458787"/>
+          </a:xfrm>
+          <a:prstGeom prst="rect">
+            <a:avLst/>
+          </a:prstGeom>
+        </p:spPr>
+        <p:txBody>
+          <a:bodyPr vert="horz" lIns="91440" tIns="45720" rIns="91440" bIns="45720" rtlCol="0" anchor="b"/>
+          <a:lstStyle>
+            <a:lvl1pPr algn="l">
+              <a:defRPr sz="1200"/>
+            </a:lvl1pPr>
+          </a:lstStyle>
+          <a:p>
+            <a:endParaRPr lang="es-ES_tradnl"/>
+          </a:p>
+        </p:txBody>
+      </p:sp>
+      <p:sp>
+        <p:nvSpPr>
+          <p:cNvPr id="7" name="Marcador de número de diapositiva 6"/>
+          <p:cNvSpPr>
+            <a:spLocks noGrp="1"/>
+          </p:cNvSpPr>
+          <p:nvPr>
+            <p:ph type="sldNum" sz="quarter" idx="5"/>
+          </p:nvPr>
+        </p:nvSpPr>
+        <p:spPr>
+          <a:xfrm>
+            <a:off x="3884613" y="8685213"/>
+            <a:ext cx="2971800" cy="458787"/>
+          </a:xfrm>
+          <a:prstGeom prst="rect">
+            <a:avLst/>
+          </a:prstGeom>
+        </p:spPr>
+        <p:txBody>
+          <a:bodyPr vert="horz" lIns="91440" tIns="45720" rIns="91440" bIns="45720" rtlCol="0" anchor="b"/>
+          <a:lstStyle>
+            <a:lvl1pPr algn="r">
+              <a:defRPr sz="1200"/>
+            </a:lvl1pPr>
+          </a:lstStyle>
+          <a:p>
+            <a:fld id="{AB87729A-BA9F-8C4B-A015-C9ED7C951017}" type="slidenum">
+              <a:rPr lang="es-ES_tradnl" smtClean="0"/>
+              <a:t>‹Nr.›</a:t>
+            </a:fld>
+            <a:endParaRPr lang="es-ES_tradnl"/>
+          </a:p>
+        </p:txBody>
+      </p:sp>
+    </p:spTree>
+    <p:extLst>
+      <p:ext uri="{BB962C8B-B14F-4D97-AF65-F5344CB8AC3E}">
+        <p14:creationId xmlns:p14="http://schemas.microsoft.com/office/powerpoint/2010/main" val="360844282"/>
+      </p:ext>
+    </p:extLst>
+  </p:cSld>
+  <p:clrMap bg1="lt1" tx1="dk1" bg2="lt2" tx2="dk2" accent1="accent1" accent2="accent2" accent3="accent3" accent4="accent4" accent5="accent5" accent6="accent6" hlink="hlink" folHlink="folHlink"/>
+  <p:notesStyle>
+    <a:lvl1pPr marL="0" algn="l" defTabSz="914400" rtl="0" eaLnBrk="1" latinLnBrk="0" hangingPunct="1">
+      <a:defRPr sz="1200" kern="1200">
+        <a:solidFill>
+          <a:schemeClr val="tx1"/>
+        </a:solidFill>
+        <a:latin typeface="+mn-lt"/>
+        <a:ea typeface="+mn-ea"/>
+        <a:cs typeface="+mn-cs"/>
+      </a:defRPr>
+    </a:lvl1pPr>
+    <a:lvl2pPr marL="457200" algn="l" defTabSz="914400" rtl="0" eaLnBrk="1" latinLnBrk="0" hangingPunct="1">
+      <a:defRPr sz="1200" kern="1200">
+        <a:solidFill>
+          <a:schemeClr val="tx1"/>
+        </a:solidFill>
+        <a:latin typeface="+mn-lt"/>
+        <a:ea typeface="+mn-ea"/>
+        <a:cs typeface="+mn-cs"/>
+      </a:defRPr>
+    </a:lvl2pPr>
+    <a:lvl3pPr marL="914400" algn="l" defTabSz="914400" rtl="0" eaLnBrk="1" latinLnBrk="0" hangingPunct="1">
+      <a:defRPr sz="1200" kern="1200">
+        <a:solidFill>
+          <a:schemeClr val="tx1"/>
+        </a:solidFill>
+        <a:latin typeface="+mn-lt"/>
+        <a:ea typeface="+mn-ea"/>
+        <a:cs typeface="+mn-cs"/>
+      </a:defRPr>
+    </a:lvl3pPr>
+    <a:lvl4pPr marL="1371600" algn="l" defTabSz="914400" rtl="0" eaLnBrk="1" latinLnBrk="0" hangingPunct="1">
+      <a:defRPr sz="1200" kern="1200">
+        <a:solidFill>
+          <a:schemeClr val="tx1"/>
+        </a:solidFill>
+        <a:latin typeface="+mn-lt"/>
+        <a:ea typeface="+mn-ea"/>
+        <a:cs typeface="+mn-cs"/>
+      </a:defRPr>
+    </a:lvl4pPr>
+    <a:lvl5pPr marL="1828800" algn="l" defTabSz="914400" rtl="0" eaLnBrk="1" latinLnBrk="0" hangingPunct="1">
+      <a:defRPr sz="1200" kern="1200">
+        <a:solidFill>
+          <a:schemeClr val="tx1"/>
+        </a:solidFill>
+        <a:latin typeface="+mn-lt"/>
+        <a:ea typeface="+mn-ea"/>
+        <a:cs typeface="+mn-cs"/>
+      </a:defRPr>
+    </a:lvl5pPr>
+    <a:lvl6pPr marL="2286000" algn="l" defTabSz="914400" rtl="0" eaLnBrk="1" latinLnBrk="0" hangingPunct="1">
+      <a:defRPr sz="1200" kern="1200">
+        <a:solidFill>
+          <a:schemeClr val="tx1"/>
+        </a:solidFill>
+        <a:latin typeface="+mn-lt"/>
+        <a:ea typeface="+mn-ea"/>
+        <a:cs typeface="+mn-cs"/>
+      </a:defRPr>
+    </a:lvl6pPr>
+    <a:lvl7pPr marL="2743200" algn="l" defTabSz="914400" rtl="0" eaLnBrk="1" latinLnBrk="0" hangingPunct="1">
+      <a:defRPr sz="1200" kern="1200">
+        <a:solidFill>
+          <a:schemeClr val="tx1"/>
+        </a:solidFill>
+        <a:latin typeface="+mn-lt"/>
+        <a:ea typeface="+mn-ea"/>
+        <a:cs typeface="+mn-cs"/>
+      </a:defRPr>
+    </a:lvl7pPr>
+    <a:lvl8pPr marL="3200400" algn="l" defTabSz="914400" rtl="0" eaLnBrk="1" latinLnBrk="0" hangingPunct="1">
+      <a:defRPr sz="1200" kern="1200">
+        <a:solidFill>
+          <a:schemeClr val="tx1"/>
+        </a:solidFill>
+        <a:latin typeface="+mn-lt"/>
+        <a:ea typeface="+mn-ea"/>
+        <a:cs typeface="+mn-cs"/>
+      </a:defRPr>
+    </a:lvl8pPr>
+    <a:lvl9pPr marL="3657600" algn="l" defTabSz="914400" rtl="0" eaLnBrk="1" latinLnBrk="0" hangingPunct="1">
+      <a:defRPr sz="1200" kern="1200">
+        <a:solidFill>
+          <a:schemeClr val="tx1"/>
+        </a:solidFill>
+        <a:latin typeface="+mn-lt"/>
+        <a:ea typeface="+mn-ea"/>
+        <a:cs typeface="+mn-cs"/>
+      </a:defRPr>
+    </a:lvl9pPr>
+  </p:notesStyle>
+</p:notesMaster>
+</file>
+
+<file path=ppt/notesSlides/notesSlide1.xml><?xml version="1.0" encoding="utf-8"?>
+<p:notes xmlns:a="http://schemas.openxmlformats.org/drawingml/2006/main" xmlns:r="http://schemas.openxmlformats.org/officeDocument/2006/relationships" xmlns:p="http://schemas.openxmlformats.org/presentationml/2006/main">
+  <p:cSld>
+    <p:spTree>
+      <p:nvGrpSpPr>
+        <p:cNvPr id="1" name=""/>
+        <p:cNvGrpSpPr/>
+        <p:nvPr/>
+      </p:nvGrpSpPr>
+      <p:grpSpPr>
+        <a:xfrm>
+          <a:off x="0" y="0"/>
+          <a:ext cx="0" cy="0"/>
+          <a:chOff x="0" y="0"/>
+          <a:chExt cx="0" cy="0"/>
+        </a:xfrm>
+      </p:grpSpPr>
+      <p:sp>
+        <p:nvSpPr>
+          <p:cNvPr id="2" name="Marcador de imagen de diapositiva 1"/>
+          <p:cNvSpPr>
+            <a:spLocks noGrp="1" noRot="1" noChangeAspect="1"/>
+          </p:cNvSpPr>
+          <p:nvPr>
+            <p:ph type="sldImg"/>
+          </p:nvPr>
+        </p:nvSpPr>
+        <p:spPr/>
+      </p:sp>
+      <p:sp>
+        <p:nvSpPr>
+          <p:cNvPr id="3" name="Marcador de notas 2"/>
+          <p:cNvSpPr>
+            <a:spLocks noGrp="1"/>
+          </p:cNvSpPr>
+          <p:nvPr>
+            <p:ph type="body" idx="1"/>
+          </p:nvPr>
+        </p:nvSpPr>
+        <p:spPr/>
+        <p:txBody>
+          <a:bodyPr/>
+          <a:lstStyle/>
+          <a:p>
+            <a:endParaRPr lang="es-ES_tradnl" dirty="0"/>
+          </a:p>
+        </p:txBody>
+      </p:sp>
+      <p:sp>
+        <p:nvSpPr>
+          <p:cNvPr id="4" name="Marcador de número de diapositiva 3"/>
+          <p:cNvSpPr>
+            <a:spLocks noGrp="1"/>
+          </p:cNvSpPr>
+          <p:nvPr>
+            <p:ph type="sldNum" sz="quarter" idx="10"/>
+          </p:nvPr>
+        </p:nvSpPr>
+        <p:spPr/>
+        <p:txBody>
+          <a:bodyPr/>
+          <a:lstStyle/>
+          <a:p>
+            <a:fld id="{AB87729A-BA9F-8C4B-A015-C9ED7C951017}" type="slidenum">
+              <a:rPr lang="es-ES_tradnl" smtClean="0"/>
+              <a:t>2</a:t>
+            </a:fld>
+            <a:endParaRPr lang="es-ES_tradnl"/>
+          </a:p>
+        </p:txBody>
+      </p:sp>
+    </p:spTree>
+    <p:extLst>
+      <p:ext uri="{BB962C8B-B14F-4D97-AF65-F5344CB8AC3E}">
+        <p14:creationId xmlns:p14="http://schemas.microsoft.com/office/powerpoint/2010/main" val="524296695"/>
+      </p:ext>
+    </p:extLst>
+  </p:cSld>
+  <p:clrMapOvr>
+    <a:masterClrMapping/>
+  </p:clrMapOvr>
+</p:notes>
 </file>
 
 <file path=ppt/slideLayouts/slideLayout1.xml><?xml version="1.0" encoding="utf-8"?>
@@ -3069,16 +3512,16 @@
           </a:p>
           <a:p>
             <a:r>
-              <a:rPr lang="es-ES_tradnl" smtClean="0"/>
+              <a:rPr lang="es-ES_tradnl" dirty="0" smtClean="0"/>
               <a:t/>
             </a:r>
             <a:br>
-              <a:rPr lang="es-ES_tradnl" smtClean="0"/>
+              <a:rPr lang="es-ES_tradnl" dirty="0" smtClean="0"/>
             </a:br>
-            <a:endParaRPr lang="es-ES_tradnl" smtClean="0"/>
-          </a:p>
-          <a:p>
-            <a:endParaRPr lang="es-ES_tradnl"/>
+            <a:endParaRPr lang="es-ES_tradnl" dirty="0" smtClean="0"/>
+          </a:p>
+          <a:p>
+            <a:endParaRPr lang="es-ES_tradnl" dirty="0"/>
           </a:p>
         </p:txBody>
       </p:sp>
@@ -3092,6 +3535,1777 @@
   <p:clrMapOvr>
     <a:masterClrMapping/>
   </p:clrMapOvr>
+  <p:timing>
+    <p:tnLst>
+      <p:par>
+        <p:cTn id="1" dur="indefinite" restart="never" nodeType="tmRoot"/>
+      </p:par>
+    </p:tnLst>
+  </p:timing>
+</p:sld>
+</file>
+
+<file path=ppt/slides/slide2.xml><?xml version="1.0" encoding="utf-8"?>
+<p:sld xmlns:a="http://schemas.openxmlformats.org/drawingml/2006/main" xmlns:r="http://schemas.openxmlformats.org/officeDocument/2006/relationships" xmlns:p="http://schemas.openxmlformats.org/presentationml/2006/main">
+  <p:cSld>
+    <p:spTree>
+      <p:nvGrpSpPr>
+        <p:cNvPr id="1" name=""/>
+        <p:cNvGrpSpPr/>
+        <p:nvPr/>
+      </p:nvGrpSpPr>
+      <p:grpSpPr>
+        <a:xfrm>
+          <a:off x="0" y="0"/>
+          <a:ext cx="0" cy="0"/>
+          <a:chOff x="0" y="0"/>
+          <a:chExt cx="0" cy="0"/>
+        </a:xfrm>
+      </p:grpSpPr>
+      <p:pic>
+        <p:nvPicPr>
+          <p:cNvPr id="2" name="Imagen 1"/>
+          <p:cNvPicPr>
+            <a:picLocks noChangeAspect="1"/>
+          </p:cNvPicPr>
+          <p:nvPr/>
+        </p:nvPicPr>
+        <p:blipFill>
+          <a:blip r:embed="rId3"/>
+          <a:stretch>
+            <a:fillRect/>
+          </a:stretch>
+        </p:blipFill>
+        <p:spPr>
+          <a:xfrm>
+            <a:off x="2839481" y="1061884"/>
+            <a:ext cx="6604000" cy="4267200"/>
+          </a:xfrm>
+          <a:prstGeom prst="rect">
+            <a:avLst/>
+          </a:prstGeom>
+        </p:spPr>
+      </p:pic>
+      <p:sp>
+        <p:nvSpPr>
+          <p:cNvPr id="3" name="CuadroTexto 2"/>
+          <p:cNvSpPr txBox="1"/>
+          <p:nvPr/>
+        </p:nvSpPr>
+        <p:spPr>
+          <a:xfrm>
+            <a:off x="4764563" y="292443"/>
+            <a:ext cx="3022585" cy="769441"/>
+          </a:xfrm>
+          <a:prstGeom prst="rect">
+            <a:avLst/>
+          </a:prstGeom>
+          <a:noFill/>
+        </p:spPr>
+        <p:txBody>
+          <a:bodyPr wrap="square" rtlCol="0">
+            <a:spAutoFit/>
+          </a:bodyPr>
+          <a:lstStyle/>
+          <a:p>
+            <a:r>
+              <a:rPr lang="es-ES_tradnl" sz="4400" smtClean="0">
+                <a:solidFill>
+                  <a:srgbClr val="0070C9"/>
+                </a:solidFill>
+              </a:rPr>
+              <a:t>SharePoint</a:t>
+            </a:r>
+            <a:endParaRPr lang="es-ES_tradnl" sz="4400">
+              <a:solidFill>
+                <a:srgbClr val="0070C9"/>
+              </a:solidFill>
+            </a:endParaRPr>
+          </a:p>
+        </p:txBody>
+      </p:sp>
+      <p:sp>
+        <p:nvSpPr>
+          <p:cNvPr id="4" name="CuadroTexto 3"/>
+          <p:cNvSpPr txBox="1"/>
+          <p:nvPr/>
+        </p:nvSpPr>
+        <p:spPr>
+          <a:xfrm>
+            <a:off x="451905" y="946267"/>
+            <a:ext cx="7470475" cy="1446550"/>
+          </a:xfrm>
+          <a:prstGeom prst="rect">
+            <a:avLst/>
+          </a:prstGeom>
+          <a:noFill/>
+        </p:spPr>
+        <p:txBody>
+          <a:bodyPr wrap="square" rtlCol="0">
+            <a:spAutoFit/>
+          </a:bodyPr>
+          <a:lstStyle>
+            <a:defPPr>
+              <a:defRPr lang="es-ES_tradnl"/>
+            </a:defPPr>
+            <a:lvl1pPr>
+              <a:defRPr sz="4400">
+                <a:solidFill>
+                  <a:srgbClr val="0070C9"/>
+                </a:solidFill>
+              </a:defRPr>
+            </a:lvl1pPr>
+          </a:lstStyle>
+          <a:p>
+            <a:r>
+              <a:rPr lang="es-ES_tradnl" dirty="0" err="1" smtClean="0"/>
+              <a:t>is</a:t>
+            </a:r>
+            <a:r>
+              <a:rPr lang="es-ES_tradnl" dirty="0" smtClean="0"/>
+              <a:t> </a:t>
+            </a:r>
+            <a:r>
+              <a:rPr lang="es-ES_tradnl" b="1" dirty="0" err="1"/>
+              <a:t>not</a:t>
+            </a:r>
+            <a:r>
+              <a:rPr lang="es-ES_tradnl" dirty="0"/>
+              <a:t> SharePoint </a:t>
+            </a:r>
+            <a:endParaRPr lang="es-ES_tradnl" dirty="0" smtClean="0"/>
+          </a:p>
+          <a:p>
+            <a:r>
+              <a:rPr lang="es-ES_tradnl" dirty="0" err="1" smtClean="0"/>
+              <a:t>anymore</a:t>
+            </a:r>
+            <a:endParaRPr lang="es-ES_tradnl" dirty="0"/>
+          </a:p>
+        </p:txBody>
+      </p:sp>
+      <p:pic>
+        <p:nvPicPr>
+          <p:cNvPr id="6" name="Imagen 5"/>
+          <p:cNvPicPr>
+            <a:picLocks noChangeAspect="1"/>
+          </p:cNvPicPr>
+          <p:nvPr/>
+        </p:nvPicPr>
+        <p:blipFill>
+          <a:blip r:embed="rId4"/>
+          <a:stretch>
+            <a:fillRect/>
+          </a:stretch>
+        </p:blipFill>
+        <p:spPr>
+          <a:xfrm>
+            <a:off x="5743580" y="1061883"/>
+            <a:ext cx="5596991" cy="5494191"/>
+          </a:xfrm>
+          <a:prstGeom prst="rect">
+            <a:avLst/>
+          </a:prstGeom>
+        </p:spPr>
+      </p:pic>
+    </p:spTree>
+    <p:extLst>
+      <p:ext uri="{BB962C8B-B14F-4D97-AF65-F5344CB8AC3E}">
+        <p14:creationId xmlns:p14="http://schemas.microsoft.com/office/powerpoint/2010/main" val="2588171668"/>
+      </p:ext>
+    </p:extLst>
+  </p:cSld>
+  <p:clrMapOvr>
+    <a:masterClrMapping/>
+  </p:clrMapOvr>
+  <p:timing>
+    <p:tnLst>
+      <p:par>
+        <p:cTn id="1" dur="indefinite" restart="never" nodeType="tmRoot">
+          <p:childTnLst>
+            <p:seq concurrent="1" nextAc="seek">
+              <p:cTn id="2" dur="indefinite" nodeType="mainSeq">
+                <p:childTnLst>
+                  <p:par>
+                    <p:cTn id="3" fill="hold">
+                      <p:stCondLst>
+                        <p:cond delay="indefinite"/>
+                      </p:stCondLst>
+                      <p:childTnLst>
+                        <p:par>
+                          <p:cTn id="4" fill="hold">
+                            <p:stCondLst>
+                              <p:cond delay="0"/>
+                            </p:stCondLst>
+                            <p:childTnLst>
+                              <p:par>
+                                <p:cTn id="5" presetID="2" presetClass="exit" presetSubtype="4" fill="hold" nodeType="clickEffect">
+                                  <p:stCondLst>
+                                    <p:cond delay="0"/>
+                                  </p:stCondLst>
+                                  <p:childTnLst>
+                                    <p:anim calcmode="lin" valueType="num">
+                                      <p:cBhvr additive="base">
+                                        <p:cTn id="6" dur="1000"/>
+                                        <p:tgtEl>
+                                          <p:spTgt spid="2"/>
+                                        </p:tgtEl>
+                                        <p:attrNameLst>
+                                          <p:attrName>ppt_x</p:attrName>
+                                        </p:attrNameLst>
+                                      </p:cBhvr>
+                                      <p:tavLst>
+                                        <p:tav tm="0">
+                                          <p:val>
+                                            <p:strVal val="ppt_x"/>
+                                          </p:val>
+                                        </p:tav>
+                                        <p:tav tm="100000">
+                                          <p:val>
+                                            <p:strVal val="ppt_x"/>
+                                          </p:val>
+                                        </p:tav>
+                                      </p:tavLst>
+                                    </p:anim>
+                                    <p:anim calcmode="lin" valueType="num">
+                                      <p:cBhvr additive="base">
+                                        <p:cTn id="7" dur="1000"/>
+                                        <p:tgtEl>
+                                          <p:spTgt spid="2"/>
+                                        </p:tgtEl>
+                                        <p:attrNameLst>
+                                          <p:attrName>ppt_y</p:attrName>
+                                        </p:attrNameLst>
+                                      </p:cBhvr>
+                                      <p:tavLst>
+                                        <p:tav tm="0">
+                                          <p:val>
+                                            <p:strVal val="ppt_y"/>
+                                          </p:val>
+                                        </p:tav>
+                                        <p:tav tm="100000">
+                                          <p:val>
+                                            <p:strVal val="1+ppt_h/2"/>
+                                          </p:val>
+                                        </p:tav>
+                                      </p:tavLst>
+                                    </p:anim>
+                                    <p:set>
+                                      <p:cBhvr>
+                                        <p:cTn id="8" dur="1" fill="hold">
+                                          <p:stCondLst>
+                                            <p:cond delay="999"/>
+                                          </p:stCondLst>
+                                        </p:cTn>
+                                        <p:tgtEl>
+                                          <p:spTgt spid="2"/>
+                                        </p:tgtEl>
+                                        <p:attrNameLst>
+                                          <p:attrName>style.visibility</p:attrName>
+                                        </p:attrNameLst>
+                                      </p:cBhvr>
+                                      <p:to>
+                                        <p:strVal val="hidden"/>
+                                      </p:to>
+                                    </p:set>
+                                  </p:childTnLst>
+                                </p:cTn>
+                              </p:par>
+                              <p:par>
+                                <p:cTn id="9" presetID="42" presetClass="path" presetSubtype="0" accel="50000" decel="50000" fill="hold" grpId="0" nodeType="withEffect">
+                                  <p:stCondLst>
+                                    <p:cond delay="0"/>
+                                  </p:stCondLst>
+                                  <p:childTnLst>
+                                    <p:animMotion origin="layout" path="M -3.54167E-6 -1.11111E-6 L -0.35338 -0.00301 " pathEditMode="relative" rAng="0" ptsTypes="AA">
+                                      <p:cBhvr>
+                                        <p:cTn id="10" dur="2000" fill="hold"/>
+                                        <p:tgtEl>
+                                          <p:spTgt spid="3"/>
+                                        </p:tgtEl>
+                                        <p:attrNameLst>
+                                          <p:attrName>ppt_x</p:attrName>
+                                          <p:attrName>ppt_y</p:attrName>
+                                        </p:attrNameLst>
+                                      </p:cBhvr>
+                                      <p:rCtr x="-17669" y="-162"/>
+                                    </p:animMotion>
+                                  </p:childTnLst>
+                                </p:cTn>
+                              </p:par>
+                            </p:childTnLst>
+                          </p:cTn>
+                        </p:par>
+                        <p:par>
+                          <p:cTn id="11" fill="hold">
+                            <p:stCondLst>
+                              <p:cond delay="2000"/>
+                            </p:stCondLst>
+                            <p:childTnLst>
+                              <p:par>
+                                <p:cTn id="12" presetID="1" presetClass="entr" presetSubtype="0" fill="hold" grpId="0" nodeType="afterEffect">
+                                  <p:stCondLst>
+                                    <p:cond delay="0"/>
+                                  </p:stCondLst>
+                                  <p:childTnLst>
+                                    <p:set>
+                                      <p:cBhvr>
+                                        <p:cTn id="13" dur="1" fill="hold">
+                                          <p:stCondLst>
+                                            <p:cond delay="0"/>
+                                          </p:stCondLst>
+                                        </p:cTn>
+                                        <p:tgtEl>
+                                          <p:spTgt spid="4"/>
+                                        </p:tgtEl>
+                                        <p:attrNameLst>
+                                          <p:attrName>style.visibility</p:attrName>
+                                        </p:attrNameLst>
+                                      </p:cBhvr>
+                                      <p:to>
+                                        <p:strVal val="visible"/>
+                                      </p:to>
+                                    </p:set>
+                                  </p:childTnLst>
+                                </p:cTn>
+                              </p:par>
+                            </p:childTnLst>
+                          </p:cTn>
+                        </p:par>
+                        <p:par>
+                          <p:cTn id="14" fill="hold">
+                            <p:stCondLst>
+                              <p:cond delay="2000"/>
+                            </p:stCondLst>
+                            <p:childTnLst>
+                              <p:par>
+                                <p:cTn id="15" presetID="1" presetClass="entr" presetSubtype="0" fill="hold" nodeType="afterEffect">
+                                  <p:stCondLst>
+                                    <p:cond delay="500"/>
+                                  </p:stCondLst>
+                                  <p:childTnLst>
+                                    <p:set>
+                                      <p:cBhvr>
+                                        <p:cTn id="16" dur="1" fill="hold">
+                                          <p:stCondLst>
+                                            <p:cond delay="0"/>
+                                          </p:stCondLst>
+                                        </p:cTn>
+                                        <p:tgtEl>
+                                          <p:spTgt spid="6"/>
+                                        </p:tgtEl>
+                                        <p:attrNameLst>
+                                          <p:attrName>style.visibility</p:attrName>
+                                        </p:attrNameLst>
+                                      </p:cBhvr>
+                                      <p:to>
+                                        <p:strVal val="visible"/>
+                                      </p:to>
+                                    </p:set>
+                                  </p:childTnLst>
+                                </p:cTn>
+                              </p:par>
+                            </p:childTnLst>
+                          </p:cTn>
+                        </p:par>
+                      </p:childTnLst>
+                    </p:cTn>
+                  </p:par>
+                </p:childTnLst>
+              </p:cTn>
+              <p:prevCondLst>
+                <p:cond evt="onPrev" delay="0">
+                  <p:tgtEl>
+                    <p:sldTgt/>
+                  </p:tgtEl>
+                </p:cond>
+              </p:prevCondLst>
+              <p:nextCondLst>
+                <p:cond evt="onNext" delay="0">
+                  <p:tgtEl>
+                    <p:sldTgt/>
+                  </p:tgtEl>
+                </p:cond>
+              </p:nextCondLst>
+            </p:seq>
+          </p:childTnLst>
+        </p:cTn>
+      </p:par>
+    </p:tnLst>
+    <p:bldLst>
+      <p:bldP spid="3" grpId="0"/>
+      <p:bldP spid="4" grpId="0"/>
+    </p:bldLst>
+  </p:timing>
+</p:sld>
+</file>
+
+<file path=ppt/slides/slide3.xml><?xml version="1.0" encoding="utf-8"?>
+<p:sld xmlns:a="http://schemas.openxmlformats.org/drawingml/2006/main" xmlns:r="http://schemas.openxmlformats.org/officeDocument/2006/relationships" xmlns:p="http://schemas.openxmlformats.org/presentationml/2006/main">
+  <p:cSld>
+    <p:spTree>
+      <p:nvGrpSpPr>
+        <p:cNvPr id="1" name=""/>
+        <p:cNvGrpSpPr/>
+        <p:nvPr/>
+      </p:nvGrpSpPr>
+      <p:grpSpPr>
+        <a:xfrm>
+          <a:off x="0" y="0"/>
+          <a:ext cx="0" cy="0"/>
+          <a:chOff x="0" y="0"/>
+          <a:chExt cx="0" cy="0"/>
+        </a:xfrm>
+      </p:grpSpPr>
+      <p:sp>
+        <p:nvSpPr>
+          <p:cNvPr id="3" name="CuadroTexto 2"/>
+          <p:cNvSpPr txBox="1"/>
+          <p:nvPr/>
+        </p:nvSpPr>
+        <p:spPr>
+          <a:xfrm>
+            <a:off x="2294626" y="1121434"/>
+            <a:ext cx="7125419" cy="2062103"/>
+          </a:xfrm>
+          <a:prstGeom prst="rect">
+            <a:avLst/>
+          </a:prstGeom>
+          <a:noFill/>
+        </p:spPr>
+        <p:txBody>
+          <a:bodyPr wrap="square" rtlCol="0">
+            <a:spAutoFit/>
+          </a:bodyPr>
+          <a:lstStyle/>
+          <a:p>
+            <a:r>
+              <a:rPr lang="es-ES_tradnl" sz="3200" dirty="0" err="1" smtClean="0"/>
+              <a:t>Keep</a:t>
+            </a:r>
+            <a:r>
+              <a:rPr lang="es-ES_tradnl" sz="3200" dirty="0" smtClean="0"/>
+              <a:t> </a:t>
+            </a:r>
+            <a:r>
+              <a:rPr lang="es-ES_tradnl" sz="3200" dirty="0" err="1" smtClean="0"/>
+              <a:t>Calm</a:t>
+            </a:r>
+            <a:endParaRPr lang="es-ES_tradnl" sz="3200" dirty="0" smtClean="0"/>
+          </a:p>
+          <a:p>
+            <a:r>
+              <a:rPr lang="es-ES_tradnl" sz="3200" dirty="0" smtClean="0"/>
+              <a:t>And </a:t>
+            </a:r>
+          </a:p>
+          <a:p>
+            <a:r>
+              <a:rPr lang="es-ES_tradnl" sz="3200" dirty="0" smtClean="0"/>
+              <a:t>Be Modern</a:t>
+            </a:r>
+          </a:p>
+          <a:p>
+            <a:r>
+              <a:rPr lang="es-ES_tradnl" sz="3200" dirty="0" smtClean="0"/>
+              <a:t>(</a:t>
+            </a:r>
+            <a:r>
+              <a:rPr lang="es-ES_tradnl" sz="3200" dirty="0" err="1" smtClean="0"/>
+              <a:t>find</a:t>
+            </a:r>
+            <a:r>
+              <a:rPr lang="es-ES_tradnl" sz="3200" dirty="0" smtClean="0"/>
+              <a:t> a </a:t>
+            </a:r>
+            <a:r>
+              <a:rPr lang="es-ES_tradnl" sz="3200" dirty="0" err="1" smtClean="0"/>
+              <a:t>picture</a:t>
+            </a:r>
+            <a:r>
+              <a:rPr lang="es-ES_tradnl" sz="3200" dirty="0" smtClean="0"/>
+              <a:t>)</a:t>
+            </a:r>
+            <a:endParaRPr lang="es-ES_tradnl" sz="3200" dirty="0"/>
+          </a:p>
+        </p:txBody>
+      </p:sp>
+    </p:spTree>
+    <p:extLst>
+      <p:ext uri="{BB962C8B-B14F-4D97-AF65-F5344CB8AC3E}">
+        <p14:creationId xmlns:p14="http://schemas.microsoft.com/office/powerpoint/2010/main" val="505419229"/>
+      </p:ext>
+    </p:extLst>
+  </p:cSld>
+  <p:clrMapOvr>
+    <a:masterClrMapping/>
+  </p:clrMapOvr>
+  <p:timing>
+    <p:tnLst>
+      <p:par>
+        <p:cTn id="1" dur="indefinite" restart="never" nodeType="tmRoot"/>
+      </p:par>
+    </p:tnLst>
+  </p:timing>
+</p:sld>
+</file>
+
+<file path=ppt/slides/slide4.xml><?xml version="1.0" encoding="utf-8"?>
+<p:sld xmlns:a="http://schemas.openxmlformats.org/drawingml/2006/main" xmlns:r="http://schemas.openxmlformats.org/officeDocument/2006/relationships" xmlns:p="http://schemas.openxmlformats.org/presentationml/2006/main">
+  <p:cSld>
+    <p:spTree>
+      <p:nvGrpSpPr>
+        <p:cNvPr id="1" name=""/>
+        <p:cNvGrpSpPr/>
+        <p:nvPr/>
+      </p:nvGrpSpPr>
+      <p:grpSpPr>
+        <a:xfrm>
+          <a:off x="0" y="0"/>
+          <a:ext cx="0" cy="0"/>
+          <a:chOff x="0" y="0"/>
+          <a:chExt cx="0" cy="0"/>
+        </a:xfrm>
+      </p:grpSpPr>
+      <p:sp>
+        <p:nvSpPr>
+          <p:cNvPr id="2" name="Rectángulo 1"/>
+          <p:cNvSpPr/>
+          <p:nvPr/>
+        </p:nvSpPr>
+        <p:spPr>
+          <a:xfrm>
+            <a:off x="688345" y="432122"/>
+            <a:ext cx="3062890" cy="3139321"/>
+          </a:xfrm>
+          <a:prstGeom prst="rect">
+            <a:avLst/>
+          </a:prstGeom>
+        </p:spPr>
+        <p:txBody>
+          <a:bodyPr wrap="none">
+            <a:spAutoFit/>
+          </a:bodyPr>
+          <a:lstStyle/>
+          <a:p>
+            <a:r>
+              <a:rPr lang="es-ES_tradnl" dirty="0" err="1" smtClean="0"/>
+              <a:t>WPs</a:t>
+            </a:r>
+            <a:r>
+              <a:rPr lang="es-ES_tradnl" dirty="0" smtClean="0"/>
+              <a:t> </a:t>
+            </a:r>
+            <a:r>
+              <a:rPr lang="es-ES_tradnl" dirty="0" err="1" smtClean="0"/>
+              <a:t>samples</a:t>
+            </a:r>
+            <a:r>
+              <a:rPr lang="es-ES_tradnl" dirty="0" smtClean="0"/>
+              <a:t> </a:t>
+            </a:r>
+            <a:r>
+              <a:rPr lang="es-ES_tradnl" dirty="0" err="1" smtClean="0"/>
+              <a:t>from</a:t>
+            </a:r>
+            <a:r>
+              <a:rPr lang="es-ES_tradnl" dirty="0" smtClean="0"/>
+              <a:t> </a:t>
+            </a:r>
+            <a:r>
+              <a:rPr lang="es-ES_tradnl" dirty="0" err="1" smtClean="0"/>
+              <a:t>Community</a:t>
+            </a:r>
+            <a:endParaRPr lang="es-ES_tradnl" dirty="0" smtClean="0"/>
+          </a:p>
+          <a:p>
+            <a:endParaRPr lang="es-ES_tradnl" dirty="0"/>
+          </a:p>
+          <a:p>
+            <a:pPr marL="285750" indent="-285750">
+              <a:buFontTx/>
+              <a:buChar char="-"/>
+            </a:pPr>
+            <a:r>
+              <a:rPr lang="es-ES_tradnl" dirty="0" smtClean="0"/>
+              <a:t>Content </a:t>
+            </a:r>
+            <a:r>
+              <a:rPr lang="es-ES_tradnl" dirty="0" err="1" smtClean="0"/>
+              <a:t>Query</a:t>
+            </a:r>
+            <a:r>
+              <a:rPr lang="es-ES_tradnl" dirty="0" smtClean="0"/>
+              <a:t> </a:t>
+            </a:r>
+            <a:r>
+              <a:rPr lang="es-ES_tradnl" dirty="0" err="1" smtClean="0"/>
+              <a:t>WebPart</a:t>
+            </a:r>
+            <a:endParaRPr lang="es-ES_tradnl" dirty="0" smtClean="0"/>
+          </a:p>
+          <a:p>
+            <a:pPr marL="285750" indent="-285750">
+              <a:buFontTx/>
+              <a:buChar char="-"/>
+            </a:pPr>
+            <a:r>
+              <a:rPr lang="es-ES_tradnl" dirty="0" err="1" smtClean="0"/>
+              <a:t>Search</a:t>
+            </a:r>
+            <a:r>
+              <a:rPr lang="es-ES_tradnl" dirty="0" smtClean="0"/>
+              <a:t> </a:t>
+            </a:r>
+            <a:r>
+              <a:rPr lang="es-ES_tradnl" dirty="0" err="1" smtClean="0"/>
+              <a:t>WebPart</a:t>
+            </a:r>
+            <a:endParaRPr lang="es-ES_tradnl" dirty="0" smtClean="0"/>
+          </a:p>
+          <a:p>
+            <a:pPr marL="285750" indent="-285750">
+              <a:buFontTx/>
+              <a:buChar char="-"/>
+            </a:pPr>
+            <a:r>
+              <a:rPr lang="es-ES_tradnl" dirty="0" smtClean="0"/>
+              <a:t>Hero</a:t>
+            </a:r>
+          </a:p>
+          <a:p>
+            <a:pPr marL="285750" indent="-285750">
+              <a:buFontTx/>
+              <a:buChar char="-"/>
+            </a:pPr>
+            <a:r>
+              <a:rPr lang="es-ES_tradnl" dirty="0" err="1" smtClean="0"/>
+              <a:t>List</a:t>
+            </a:r>
+            <a:r>
+              <a:rPr lang="es-ES_tradnl" dirty="0" smtClean="0"/>
+              <a:t> View WP</a:t>
+            </a:r>
+          </a:p>
+          <a:p>
+            <a:pPr marL="285750" indent="-285750">
+              <a:buFontTx/>
+              <a:buChar char="-"/>
+            </a:pPr>
+            <a:endParaRPr lang="es-ES_tradnl" dirty="0" smtClean="0"/>
+          </a:p>
+          <a:p>
+            <a:r>
+              <a:rPr lang="es-ES_tradnl" dirty="0" err="1" smtClean="0"/>
+              <a:t>Extensions</a:t>
+            </a:r>
+            <a:endParaRPr lang="es-ES_tradnl" dirty="0"/>
+          </a:p>
+          <a:p>
+            <a:pPr marL="285750" indent="-285750">
+              <a:buFontTx/>
+              <a:buChar char="-"/>
+            </a:pPr>
+            <a:r>
+              <a:rPr lang="es-ES_tradnl" dirty="0" smtClean="0"/>
+              <a:t>Paolo </a:t>
+            </a:r>
+            <a:r>
+              <a:rPr lang="es-ES_tradnl" dirty="0" err="1" smtClean="0"/>
+              <a:t>Discuss</a:t>
+            </a:r>
+            <a:r>
+              <a:rPr lang="es-ES_tradnl" dirty="0" smtClean="0"/>
+              <a:t> </a:t>
+            </a:r>
+            <a:r>
+              <a:rPr lang="es-ES_tradnl" dirty="0" err="1" smtClean="0"/>
+              <a:t>now</a:t>
+            </a:r>
+            <a:r>
+              <a:rPr lang="es-ES_tradnl" dirty="0" smtClean="0"/>
+              <a:t> </a:t>
+            </a:r>
+            <a:r>
+              <a:rPr lang="es-ES_tradnl" dirty="0" err="1" smtClean="0"/>
+              <a:t>sample</a:t>
+            </a:r>
+            <a:endParaRPr lang="es-ES_tradnl" dirty="0" smtClean="0"/>
+          </a:p>
+          <a:p>
+            <a:pPr marL="285750" indent="-285750">
+              <a:buFontTx/>
+              <a:buChar char="-"/>
+            </a:pPr>
+            <a:r>
+              <a:rPr lang="es-ES_tradnl" dirty="0" err="1" smtClean="0"/>
+              <a:t>Cognitive</a:t>
+            </a:r>
+            <a:r>
+              <a:rPr lang="es-ES_tradnl" dirty="0" smtClean="0"/>
+              <a:t> </a:t>
+            </a:r>
+            <a:r>
+              <a:rPr lang="es-ES_tradnl" dirty="0" err="1" smtClean="0"/>
+              <a:t>services</a:t>
+            </a:r>
+            <a:endParaRPr lang="es-ES_tradnl" dirty="0" smtClean="0"/>
+          </a:p>
+          <a:p>
+            <a:pPr marL="285750" indent="-285750">
+              <a:buFontTx/>
+              <a:buChar char="-"/>
+            </a:pPr>
+            <a:endParaRPr lang="es-ES_tradnl" dirty="0" smtClean="0"/>
+          </a:p>
+        </p:txBody>
+      </p:sp>
+    </p:spTree>
+    <p:extLst>
+      <p:ext uri="{BB962C8B-B14F-4D97-AF65-F5344CB8AC3E}">
+        <p14:creationId xmlns:p14="http://schemas.microsoft.com/office/powerpoint/2010/main" val="1526887522"/>
+      </p:ext>
+    </p:extLst>
+  </p:cSld>
+  <p:clrMapOvr>
+    <a:masterClrMapping/>
+  </p:clrMapOvr>
+  <p:timing>
+    <p:tnLst>
+      <p:par>
+        <p:cTn id="1" dur="indefinite" restart="never" nodeType="tmRoot"/>
+      </p:par>
+    </p:tnLst>
+  </p:timing>
+</p:sld>
+</file>
+
+<file path=ppt/slides/slide5.xml><?xml version="1.0" encoding="utf-8"?>
+<p:sld xmlns:a="http://schemas.openxmlformats.org/drawingml/2006/main" xmlns:r="http://schemas.openxmlformats.org/officeDocument/2006/relationships" xmlns:p="http://schemas.openxmlformats.org/presentationml/2006/main">
+  <p:cSld>
+    <p:spTree>
+      <p:nvGrpSpPr>
+        <p:cNvPr id="1" name=""/>
+        <p:cNvGrpSpPr/>
+        <p:nvPr/>
+      </p:nvGrpSpPr>
+      <p:grpSpPr>
+        <a:xfrm>
+          <a:off x="0" y="0"/>
+          <a:ext cx="0" cy="0"/>
+          <a:chOff x="0" y="0"/>
+          <a:chExt cx="0" cy="0"/>
+        </a:xfrm>
+      </p:grpSpPr>
+      <p:sp>
+        <p:nvSpPr>
+          <p:cNvPr id="2" name="CuadroTexto 1"/>
+          <p:cNvSpPr txBox="1"/>
+          <p:nvPr/>
+        </p:nvSpPr>
+        <p:spPr>
+          <a:xfrm>
+            <a:off x="966158" y="1104181"/>
+            <a:ext cx="2501661" cy="1569660"/>
+          </a:xfrm>
+          <a:prstGeom prst="rect">
+            <a:avLst/>
+          </a:prstGeom>
+          <a:noFill/>
+        </p:spPr>
+        <p:txBody>
+          <a:bodyPr wrap="square" rtlCol="0">
+            <a:spAutoFit/>
+          </a:bodyPr>
+          <a:lstStyle/>
+          <a:p>
+            <a:r>
+              <a:rPr lang="es-ES_tradnl" sz="2400" dirty="0" err="1" smtClean="0"/>
+              <a:t>Languages</a:t>
+            </a:r>
+            <a:endParaRPr lang="es-ES_tradnl" sz="2400" dirty="0" smtClean="0"/>
+          </a:p>
+          <a:p>
+            <a:endParaRPr lang="es-ES_tradnl" dirty="0"/>
+          </a:p>
+          <a:p>
+            <a:pPr marL="285750" indent="-285750">
+              <a:buFont typeface="Arial" charset="0"/>
+              <a:buChar char="•"/>
+            </a:pPr>
+            <a:r>
+              <a:rPr lang="es-ES_tradnl" dirty="0" err="1" smtClean="0"/>
+              <a:t>Typescript</a:t>
+            </a:r>
+            <a:endParaRPr lang="es-ES_tradnl" dirty="0" smtClean="0"/>
+          </a:p>
+          <a:p>
+            <a:pPr marL="285750" indent="-285750">
+              <a:buFont typeface="Arial" charset="0"/>
+              <a:buChar char="•"/>
+            </a:pPr>
+            <a:r>
+              <a:rPr lang="es-ES_tradnl" dirty="0" smtClean="0"/>
+              <a:t>JavaScript</a:t>
+            </a:r>
+          </a:p>
+          <a:p>
+            <a:pPr marL="285750" indent="-285750">
+              <a:buFont typeface="Arial" charset="0"/>
+              <a:buChar char="•"/>
+            </a:pPr>
+            <a:endParaRPr lang="es-ES_tradnl" dirty="0"/>
+          </a:p>
+        </p:txBody>
+      </p:sp>
+      <p:sp>
+        <p:nvSpPr>
+          <p:cNvPr id="3" name="CuadroTexto 2"/>
+          <p:cNvSpPr txBox="1"/>
+          <p:nvPr/>
+        </p:nvSpPr>
+        <p:spPr>
+          <a:xfrm>
+            <a:off x="3844505" y="1104181"/>
+            <a:ext cx="2501661" cy="2400657"/>
+          </a:xfrm>
+          <a:prstGeom prst="rect">
+            <a:avLst/>
+          </a:prstGeom>
+          <a:noFill/>
+        </p:spPr>
+        <p:txBody>
+          <a:bodyPr wrap="square" rtlCol="0">
+            <a:spAutoFit/>
+          </a:bodyPr>
+          <a:lstStyle/>
+          <a:p>
+            <a:r>
+              <a:rPr lang="es-ES_tradnl" sz="2400" dirty="0" smtClean="0"/>
+              <a:t>Tools</a:t>
+            </a:r>
+          </a:p>
+          <a:p>
+            <a:endParaRPr lang="es-ES_tradnl" dirty="0"/>
+          </a:p>
+          <a:p>
+            <a:pPr marL="285750" indent="-285750">
+              <a:buFont typeface="Arial" charset="0"/>
+              <a:buChar char="•"/>
+            </a:pPr>
+            <a:r>
+              <a:rPr lang="es-ES_tradnl" dirty="0" err="1" smtClean="0"/>
+              <a:t>Gulp</a:t>
+            </a:r>
+            <a:endParaRPr lang="es-ES_tradnl" dirty="0" smtClean="0"/>
+          </a:p>
+          <a:p>
+            <a:pPr marL="285750" indent="-285750">
+              <a:buFont typeface="Arial" charset="0"/>
+              <a:buChar char="•"/>
+            </a:pPr>
+            <a:r>
+              <a:rPr lang="es-ES_tradnl" dirty="0" err="1" smtClean="0"/>
+              <a:t>Webpack</a:t>
+            </a:r>
+            <a:endParaRPr lang="es-ES_tradnl" dirty="0" smtClean="0"/>
+          </a:p>
+          <a:p>
+            <a:pPr marL="285750" indent="-285750">
+              <a:buFont typeface="Arial" charset="0"/>
+              <a:buChar char="•"/>
+            </a:pPr>
+            <a:r>
+              <a:rPr lang="es-ES_tradnl" dirty="0" smtClean="0"/>
+              <a:t>Visual Studio </a:t>
+            </a:r>
+            <a:r>
+              <a:rPr lang="es-ES_tradnl" dirty="0" err="1" smtClean="0"/>
+              <a:t>Code</a:t>
+            </a:r>
+            <a:endParaRPr lang="es-ES_tradnl" dirty="0" smtClean="0"/>
+          </a:p>
+          <a:p>
+            <a:pPr marL="285750" indent="-285750">
+              <a:buFont typeface="Arial" charset="0"/>
+              <a:buChar char="•"/>
+            </a:pPr>
+            <a:r>
+              <a:rPr lang="es-ES_tradnl" dirty="0" err="1" smtClean="0"/>
+              <a:t>Cmd</a:t>
+            </a:r>
+            <a:r>
+              <a:rPr lang="es-ES_tradnl" dirty="0" smtClean="0"/>
+              <a:t> (</a:t>
+            </a:r>
+            <a:r>
+              <a:rPr lang="es-ES_tradnl" dirty="0" err="1" smtClean="0"/>
+              <a:t>command</a:t>
+            </a:r>
+            <a:r>
+              <a:rPr lang="es-ES_tradnl" dirty="0" smtClean="0"/>
+              <a:t> line)</a:t>
+            </a:r>
+          </a:p>
+          <a:p>
+            <a:pPr marL="285750" indent="-285750">
+              <a:buFont typeface="Arial" charset="0"/>
+              <a:buChar char="•"/>
+            </a:pPr>
+            <a:r>
+              <a:rPr lang="es-ES_tradnl" dirty="0" smtClean="0"/>
+              <a:t>Babel</a:t>
+            </a:r>
+          </a:p>
+          <a:p>
+            <a:pPr marL="285750" indent="-285750">
+              <a:buFont typeface="Arial" charset="0"/>
+              <a:buChar char="•"/>
+            </a:pPr>
+            <a:endParaRPr lang="es-ES_tradnl" dirty="0"/>
+          </a:p>
+        </p:txBody>
+      </p:sp>
+      <p:sp>
+        <p:nvSpPr>
+          <p:cNvPr id="4" name="CuadroTexto 3"/>
+          <p:cNvSpPr txBox="1"/>
+          <p:nvPr/>
+        </p:nvSpPr>
+        <p:spPr>
+          <a:xfrm>
+            <a:off x="6843626" y="1104181"/>
+            <a:ext cx="1903560" cy="3231654"/>
+          </a:xfrm>
+          <a:prstGeom prst="rect">
+            <a:avLst/>
+          </a:prstGeom>
+          <a:noFill/>
+        </p:spPr>
+        <p:txBody>
+          <a:bodyPr wrap="square" rtlCol="0">
+            <a:spAutoFit/>
+          </a:bodyPr>
+          <a:lstStyle/>
+          <a:p>
+            <a:r>
+              <a:rPr lang="es-ES_tradnl" sz="2400" dirty="0" smtClean="0"/>
+              <a:t>Frameworks</a:t>
+            </a:r>
+          </a:p>
+          <a:p>
+            <a:endParaRPr lang="es-ES_tradnl" dirty="0"/>
+          </a:p>
+          <a:p>
+            <a:pPr marL="285750" indent="-285750">
+              <a:buFont typeface="Arial" charset="0"/>
+              <a:buChar char="•"/>
+            </a:pPr>
+            <a:r>
+              <a:rPr lang="es-ES_tradnl" dirty="0" err="1" smtClean="0"/>
+              <a:t>Spfx</a:t>
+            </a:r>
+            <a:endParaRPr lang="es-ES_tradnl" dirty="0" smtClean="0"/>
+          </a:p>
+          <a:p>
+            <a:pPr marL="285750" indent="-285750">
+              <a:buFont typeface="Arial" charset="0"/>
+              <a:buChar char="•"/>
+            </a:pPr>
+            <a:r>
+              <a:rPr lang="es-ES_tradnl" dirty="0" err="1" smtClean="0"/>
+              <a:t>ReactJS</a:t>
+            </a:r>
+            <a:endParaRPr lang="es-ES_tradnl" dirty="0" smtClean="0"/>
+          </a:p>
+          <a:p>
+            <a:pPr marL="285750" indent="-285750">
+              <a:buFont typeface="Arial" charset="0"/>
+              <a:buChar char="•"/>
+            </a:pPr>
+            <a:r>
+              <a:rPr lang="es-ES_tradnl" dirty="0" err="1" smtClean="0"/>
+              <a:t>Knockout</a:t>
+            </a:r>
+            <a:endParaRPr lang="es-ES_tradnl" dirty="0" smtClean="0"/>
+          </a:p>
+          <a:p>
+            <a:pPr marL="285750" indent="-285750">
+              <a:buFont typeface="Arial" charset="0"/>
+              <a:buChar char="•"/>
+            </a:pPr>
+            <a:r>
+              <a:rPr lang="es-ES_tradnl" dirty="0" err="1" smtClean="0"/>
+              <a:t>AngularJS</a:t>
+            </a:r>
+            <a:endParaRPr lang="es-ES_tradnl" dirty="0" smtClean="0"/>
+          </a:p>
+          <a:p>
+            <a:pPr marL="285750" indent="-285750">
+              <a:buFont typeface="Arial" charset="0"/>
+              <a:buChar char="•"/>
+            </a:pPr>
+            <a:r>
+              <a:rPr lang="es-ES_tradnl" dirty="0" err="1" smtClean="0"/>
+              <a:t>VueJS</a:t>
+            </a:r>
+            <a:endParaRPr lang="es-ES_tradnl" dirty="0" smtClean="0"/>
+          </a:p>
+          <a:p>
+            <a:pPr marL="285750" indent="-285750">
+              <a:buFont typeface="Arial" charset="0"/>
+              <a:buChar char="•"/>
+            </a:pPr>
+            <a:r>
+              <a:rPr lang="es-ES_tradnl" dirty="0" err="1" smtClean="0"/>
+              <a:t>PnP</a:t>
+            </a:r>
+            <a:endParaRPr lang="es-ES_tradnl" dirty="0" smtClean="0"/>
+          </a:p>
+          <a:p>
+            <a:pPr marL="285750" indent="-285750">
+              <a:buFont typeface="Arial" charset="0"/>
+              <a:buChar char="•"/>
+            </a:pPr>
+            <a:r>
+              <a:rPr lang="es-ES_tradnl" dirty="0" err="1" smtClean="0"/>
+              <a:t>You</a:t>
+            </a:r>
+            <a:r>
+              <a:rPr lang="es-ES_tradnl" dirty="0" smtClean="0"/>
+              <a:t> </a:t>
+            </a:r>
+            <a:r>
+              <a:rPr lang="es-ES_tradnl" dirty="0" err="1" smtClean="0"/>
+              <a:t>name</a:t>
+            </a:r>
+            <a:r>
+              <a:rPr lang="es-ES_tradnl" dirty="0" smtClean="0"/>
+              <a:t> </a:t>
+            </a:r>
+            <a:r>
+              <a:rPr lang="es-ES_tradnl" dirty="0" err="1" smtClean="0"/>
+              <a:t>it</a:t>
+            </a:r>
+            <a:endParaRPr lang="es-ES_tradnl" dirty="0" smtClean="0"/>
+          </a:p>
+          <a:p>
+            <a:pPr marL="285750" indent="-285750">
+              <a:buFont typeface="Arial" charset="0"/>
+              <a:buChar char="•"/>
+            </a:pPr>
+            <a:endParaRPr lang="es-ES_tradnl" dirty="0" smtClean="0"/>
+          </a:p>
+          <a:p>
+            <a:pPr marL="285750" indent="-285750">
+              <a:buFont typeface="Arial" charset="0"/>
+              <a:buChar char="•"/>
+            </a:pPr>
+            <a:endParaRPr lang="es-ES_tradnl" dirty="0"/>
+          </a:p>
+        </p:txBody>
+      </p:sp>
+      <p:sp>
+        <p:nvSpPr>
+          <p:cNvPr id="5" name="CuadroTexto 4"/>
+          <p:cNvSpPr txBox="1"/>
+          <p:nvPr/>
+        </p:nvSpPr>
+        <p:spPr>
+          <a:xfrm>
+            <a:off x="9342409" y="1101304"/>
+            <a:ext cx="2501661" cy="2123658"/>
+          </a:xfrm>
+          <a:prstGeom prst="rect">
+            <a:avLst/>
+          </a:prstGeom>
+          <a:noFill/>
+        </p:spPr>
+        <p:txBody>
+          <a:bodyPr wrap="square" rtlCol="0">
+            <a:spAutoFit/>
+          </a:bodyPr>
+          <a:lstStyle/>
+          <a:p>
+            <a:r>
+              <a:rPr lang="es-ES_tradnl" sz="2400" dirty="0" err="1" smtClean="0"/>
+              <a:t>Words</a:t>
+            </a:r>
+            <a:endParaRPr lang="es-ES_tradnl" sz="2400" dirty="0" smtClean="0"/>
+          </a:p>
+          <a:p>
+            <a:endParaRPr lang="es-ES_tradnl" dirty="0"/>
+          </a:p>
+          <a:p>
+            <a:pPr marL="285750" indent="-285750">
+              <a:buFont typeface="Arial" charset="0"/>
+              <a:buChar char="•"/>
+            </a:pPr>
+            <a:r>
+              <a:rPr lang="es-ES_tradnl" dirty="0" err="1" smtClean="0"/>
+              <a:t>Transpile</a:t>
+            </a:r>
+            <a:endParaRPr lang="es-ES_tradnl" dirty="0" smtClean="0"/>
+          </a:p>
+          <a:p>
+            <a:pPr marL="285750" indent="-285750">
+              <a:buFont typeface="Arial" charset="0"/>
+              <a:buChar char="•"/>
+            </a:pPr>
+            <a:r>
+              <a:rPr lang="es-ES_tradnl" dirty="0" smtClean="0"/>
+              <a:t>Compile</a:t>
+            </a:r>
+          </a:p>
+          <a:p>
+            <a:pPr marL="285750" indent="-285750">
+              <a:buFont typeface="Arial" charset="0"/>
+              <a:buChar char="•"/>
+            </a:pPr>
+            <a:endParaRPr lang="es-ES_tradnl" dirty="0" smtClean="0"/>
+          </a:p>
+          <a:p>
+            <a:pPr marL="285750" indent="-285750">
+              <a:buFont typeface="Arial" charset="0"/>
+              <a:buChar char="•"/>
+            </a:pPr>
+            <a:endParaRPr lang="es-ES_tradnl" dirty="0" smtClean="0"/>
+          </a:p>
+          <a:p>
+            <a:pPr marL="285750" indent="-285750">
+              <a:buFont typeface="Arial" charset="0"/>
+              <a:buChar char="•"/>
+            </a:pPr>
+            <a:endParaRPr lang="es-ES_tradnl" dirty="0"/>
+          </a:p>
+        </p:txBody>
+      </p:sp>
+      <p:cxnSp>
+        <p:nvCxnSpPr>
+          <p:cNvPr id="9" name="Conector recto 8"/>
+          <p:cNvCxnSpPr/>
+          <p:nvPr/>
+        </p:nvCxnSpPr>
+        <p:spPr>
+          <a:xfrm>
+            <a:off x="3157267" y="690113"/>
+            <a:ext cx="18000" cy="5040000"/>
+          </a:xfrm>
+          <a:prstGeom prst="line">
+            <a:avLst/>
+          </a:prstGeom>
+        </p:spPr>
+        <p:style>
+          <a:lnRef idx="1">
+            <a:schemeClr val="dk1"/>
+          </a:lnRef>
+          <a:fillRef idx="0">
+            <a:schemeClr val="dk1"/>
+          </a:fillRef>
+          <a:effectRef idx="0">
+            <a:schemeClr val="dk1"/>
+          </a:effectRef>
+          <a:fontRef idx="minor">
+            <a:schemeClr val="tx1"/>
+          </a:fontRef>
+        </p:style>
+      </p:cxnSp>
+      <p:cxnSp>
+        <p:nvCxnSpPr>
+          <p:cNvPr id="10" name="Conector recto 9"/>
+          <p:cNvCxnSpPr/>
+          <p:nvPr/>
+        </p:nvCxnSpPr>
+        <p:spPr>
+          <a:xfrm>
+            <a:off x="6380674" y="704489"/>
+            <a:ext cx="18000" cy="5040000"/>
+          </a:xfrm>
+          <a:prstGeom prst="line">
+            <a:avLst/>
+          </a:prstGeom>
+        </p:spPr>
+        <p:style>
+          <a:lnRef idx="1">
+            <a:schemeClr val="dk1"/>
+          </a:lnRef>
+          <a:fillRef idx="0">
+            <a:schemeClr val="dk1"/>
+          </a:fillRef>
+          <a:effectRef idx="0">
+            <a:schemeClr val="dk1"/>
+          </a:effectRef>
+          <a:fontRef idx="minor">
+            <a:schemeClr val="tx1"/>
+          </a:fontRef>
+        </p:style>
+      </p:cxnSp>
+      <p:sp>
+        <p:nvSpPr>
+          <p:cNvPr id="12" name="CuadroTexto 11"/>
+          <p:cNvSpPr txBox="1"/>
+          <p:nvPr/>
+        </p:nvSpPr>
+        <p:spPr>
+          <a:xfrm>
+            <a:off x="669986" y="6262777"/>
+            <a:ext cx="5382883" cy="369332"/>
+          </a:xfrm>
+          <a:prstGeom prst="rect">
+            <a:avLst/>
+          </a:prstGeom>
+          <a:noFill/>
+        </p:spPr>
+        <p:txBody>
+          <a:bodyPr wrap="square" rtlCol="0">
+            <a:spAutoFit/>
+          </a:bodyPr>
+          <a:lstStyle/>
+          <a:p>
+            <a:r>
+              <a:rPr lang="es-ES_tradnl" dirty="0" err="1" smtClean="0">
+                <a:solidFill>
+                  <a:srgbClr val="FF0000"/>
+                </a:solidFill>
+              </a:rPr>
+              <a:t>Images</a:t>
+            </a:r>
+            <a:r>
+              <a:rPr lang="es-ES_tradnl" dirty="0" smtClean="0">
+                <a:solidFill>
+                  <a:srgbClr val="FF0000"/>
+                </a:solidFill>
+              </a:rPr>
+              <a:t> </a:t>
+            </a:r>
+            <a:r>
+              <a:rPr lang="es-ES_tradnl" dirty="0" err="1" smtClean="0">
+                <a:solidFill>
+                  <a:srgbClr val="FF0000"/>
+                </a:solidFill>
+              </a:rPr>
+              <a:t>from</a:t>
+            </a:r>
+            <a:r>
+              <a:rPr lang="es-ES_tradnl" dirty="0" smtClean="0">
+                <a:solidFill>
+                  <a:srgbClr val="FF0000"/>
+                </a:solidFill>
+              </a:rPr>
+              <a:t> </a:t>
+            </a:r>
+            <a:r>
+              <a:rPr lang="es-ES_tradnl" dirty="0" err="1" smtClean="0">
+                <a:solidFill>
+                  <a:srgbClr val="FF0000"/>
+                </a:solidFill>
+              </a:rPr>
+              <a:t>toolchain</a:t>
+            </a:r>
+            <a:r>
+              <a:rPr lang="es-ES_tradnl" dirty="0" smtClean="0">
+                <a:solidFill>
+                  <a:srgbClr val="FF0000"/>
+                </a:solidFill>
+              </a:rPr>
+              <a:t> </a:t>
+            </a:r>
+            <a:r>
+              <a:rPr lang="es-ES_tradnl" dirty="0" err="1" smtClean="0">
+                <a:solidFill>
+                  <a:srgbClr val="FF0000"/>
+                </a:solidFill>
+              </a:rPr>
+              <a:t>session</a:t>
+            </a:r>
+            <a:endParaRPr lang="es-ES_tradnl" dirty="0">
+              <a:solidFill>
+                <a:srgbClr val="FF0000"/>
+              </a:solidFill>
+            </a:endParaRPr>
+          </a:p>
+        </p:txBody>
+      </p:sp>
+      <p:cxnSp>
+        <p:nvCxnSpPr>
+          <p:cNvPr id="17" name="Conector recto 16"/>
+          <p:cNvCxnSpPr/>
+          <p:nvPr/>
+        </p:nvCxnSpPr>
+        <p:spPr>
+          <a:xfrm>
+            <a:off x="8948470" y="718865"/>
+            <a:ext cx="18000" cy="5040000"/>
+          </a:xfrm>
+          <a:prstGeom prst="line">
+            <a:avLst/>
+          </a:prstGeom>
+        </p:spPr>
+        <p:style>
+          <a:lnRef idx="1">
+            <a:schemeClr val="dk1"/>
+          </a:lnRef>
+          <a:fillRef idx="0">
+            <a:schemeClr val="dk1"/>
+          </a:fillRef>
+          <a:effectRef idx="0">
+            <a:schemeClr val="dk1"/>
+          </a:effectRef>
+          <a:fontRef idx="minor">
+            <a:schemeClr val="tx1"/>
+          </a:fontRef>
+        </p:style>
+      </p:cxnSp>
+    </p:spTree>
+    <p:extLst>
+      <p:ext uri="{BB962C8B-B14F-4D97-AF65-F5344CB8AC3E}">
+        <p14:creationId xmlns:p14="http://schemas.microsoft.com/office/powerpoint/2010/main" val="169369175"/>
+      </p:ext>
+    </p:extLst>
+  </p:cSld>
+  <p:clrMapOvr>
+    <a:masterClrMapping/>
+  </p:clrMapOvr>
+  <p:timing>
+    <p:tnLst>
+      <p:par>
+        <p:cTn id="1" dur="indefinite" restart="never" nodeType="tmRoot"/>
+      </p:par>
+    </p:tnLst>
+  </p:timing>
+</p:sld>
+</file>
+
+<file path=ppt/slides/slide6.xml><?xml version="1.0" encoding="utf-8"?>
+<p:sld xmlns:a="http://schemas.openxmlformats.org/drawingml/2006/main" xmlns:r="http://schemas.openxmlformats.org/officeDocument/2006/relationships" xmlns:p="http://schemas.openxmlformats.org/presentationml/2006/main">
+  <p:cSld>
+    <p:spTree>
+      <p:nvGrpSpPr>
+        <p:cNvPr id="1" name=""/>
+        <p:cNvGrpSpPr/>
+        <p:nvPr/>
+      </p:nvGrpSpPr>
+      <p:grpSpPr>
+        <a:xfrm>
+          <a:off x="0" y="0"/>
+          <a:ext cx="0" cy="0"/>
+          <a:chOff x="0" y="0"/>
+          <a:chExt cx="0" cy="0"/>
+        </a:xfrm>
+      </p:grpSpPr>
+      <p:sp>
+        <p:nvSpPr>
+          <p:cNvPr id="2" name="CuadroTexto 1"/>
+          <p:cNvSpPr txBox="1"/>
+          <p:nvPr/>
+        </p:nvSpPr>
+        <p:spPr>
+          <a:xfrm>
+            <a:off x="897147" y="500333"/>
+            <a:ext cx="8660921" cy="646331"/>
+          </a:xfrm>
+          <a:prstGeom prst="rect">
+            <a:avLst/>
+          </a:prstGeom>
+          <a:noFill/>
+        </p:spPr>
+        <p:txBody>
+          <a:bodyPr wrap="square" rtlCol="0">
+            <a:spAutoFit/>
+          </a:bodyPr>
+          <a:lstStyle/>
+          <a:p>
+            <a:r>
+              <a:rPr lang="es-ES_tradnl" sz="3600" dirty="0" err="1" smtClean="0"/>
+              <a:t>Learning</a:t>
+            </a:r>
+            <a:r>
+              <a:rPr lang="es-ES_tradnl" sz="3600" dirty="0" smtClean="0"/>
+              <a:t> </a:t>
+            </a:r>
+            <a:r>
+              <a:rPr lang="es-ES_tradnl" sz="3600" dirty="0" err="1" smtClean="0"/>
+              <a:t>Roadmap</a:t>
+            </a:r>
+            <a:endParaRPr lang="es-ES_tradnl" sz="3600" dirty="0"/>
+          </a:p>
+        </p:txBody>
+      </p:sp>
+      <p:sp>
+        <p:nvSpPr>
+          <p:cNvPr id="3" name="CuadroTexto 2"/>
+          <p:cNvSpPr txBox="1"/>
+          <p:nvPr/>
+        </p:nvSpPr>
+        <p:spPr>
+          <a:xfrm>
+            <a:off x="897147" y="1414732"/>
+            <a:ext cx="9851366" cy="2031325"/>
+          </a:xfrm>
+          <a:prstGeom prst="rect">
+            <a:avLst/>
+          </a:prstGeom>
+          <a:noFill/>
+        </p:spPr>
+        <p:txBody>
+          <a:bodyPr wrap="square" rtlCol="0">
+            <a:spAutoFit/>
+          </a:bodyPr>
+          <a:lstStyle/>
+          <a:p>
+            <a:pPr marL="342900" indent="-342900">
+              <a:buFont typeface="+mj-lt"/>
+              <a:buAutoNum type="arabicPeriod"/>
+            </a:pPr>
+            <a:r>
+              <a:rPr lang="es-ES_tradnl" dirty="0" err="1" smtClean="0"/>
+              <a:t>Plain</a:t>
+            </a:r>
+            <a:r>
+              <a:rPr lang="es-ES_tradnl" dirty="0" smtClean="0"/>
+              <a:t> JavaScript</a:t>
+            </a:r>
+          </a:p>
+          <a:p>
+            <a:pPr marL="342900" indent="-342900">
+              <a:buFont typeface="+mj-lt"/>
+              <a:buAutoNum type="arabicPeriod"/>
+            </a:pPr>
+            <a:r>
+              <a:rPr lang="es-ES_tradnl" dirty="0" err="1" smtClean="0"/>
+              <a:t>Typescript</a:t>
+            </a:r>
+            <a:endParaRPr lang="es-ES_tradnl" dirty="0" smtClean="0"/>
+          </a:p>
+          <a:p>
+            <a:pPr marL="342900" indent="-342900">
+              <a:buFont typeface="+mj-lt"/>
+              <a:buAutoNum type="arabicPeriod"/>
+            </a:pPr>
+            <a:r>
+              <a:rPr lang="es-ES_tradnl" dirty="0" err="1" smtClean="0"/>
+              <a:t>ReactJS</a:t>
+            </a:r>
+            <a:endParaRPr lang="es-ES_tradnl" dirty="0" smtClean="0"/>
+          </a:p>
+          <a:p>
+            <a:pPr marL="342900" indent="-342900">
+              <a:buFont typeface="+mj-lt"/>
+              <a:buAutoNum type="arabicPeriod"/>
+            </a:pPr>
+            <a:r>
+              <a:rPr lang="es-ES_tradnl" dirty="0" err="1" smtClean="0"/>
+              <a:t>Webpack</a:t>
+            </a:r>
+            <a:endParaRPr lang="es-ES_tradnl" dirty="0" smtClean="0"/>
+          </a:p>
+          <a:p>
+            <a:pPr marL="342900" indent="-342900">
+              <a:buFont typeface="+mj-lt"/>
+              <a:buAutoNum type="arabicPeriod"/>
+            </a:pPr>
+            <a:r>
+              <a:rPr lang="es-ES_tradnl" dirty="0" err="1" smtClean="0"/>
+              <a:t>Gulp</a:t>
+            </a:r>
+            <a:endParaRPr lang="es-ES_tradnl" dirty="0" smtClean="0"/>
+          </a:p>
+          <a:p>
+            <a:pPr marL="342900" indent="-342900">
+              <a:buFont typeface="+mj-lt"/>
+              <a:buAutoNum type="arabicPeriod"/>
+            </a:pPr>
+            <a:r>
+              <a:rPr lang="es-ES_tradnl" dirty="0" err="1" smtClean="0"/>
+              <a:t>Spfx</a:t>
+            </a:r>
+            <a:endParaRPr lang="es-ES_tradnl" dirty="0" smtClean="0"/>
+          </a:p>
+          <a:p>
+            <a:pPr marL="342900" indent="-342900">
+              <a:buFont typeface="+mj-lt"/>
+              <a:buAutoNum type="arabicPeriod"/>
+            </a:pPr>
+            <a:r>
+              <a:rPr lang="es-ES_tradnl" dirty="0" err="1" smtClean="0"/>
+              <a:t>PnP</a:t>
+            </a:r>
+            <a:endParaRPr lang="es-ES_tradnl" dirty="0"/>
+          </a:p>
+        </p:txBody>
+      </p:sp>
+    </p:spTree>
+    <p:extLst>
+      <p:ext uri="{BB962C8B-B14F-4D97-AF65-F5344CB8AC3E}">
+        <p14:creationId xmlns:p14="http://schemas.microsoft.com/office/powerpoint/2010/main" val="1665249639"/>
+      </p:ext>
+    </p:extLst>
+  </p:cSld>
+  <p:clrMapOvr>
+    <a:masterClrMapping/>
+  </p:clrMapOvr>
+  <p:timing>
+    <p:tnLst>
+      <p:par>
+        <p:cTn id="1" dur="indefinite" restart="never" nodeType="tmRoot"/>
+      </p:par>
+    </p:tnLst>
+  </p:timing>
+</p:sld>
+</file>
+
+<file path=ppt/slides/slide7.xml><?xml version="1.0" encoding="utf-8"?>
+<p:sld xmlns:a="http://schemas.openxmlformats.org/drawingml/2006/main" xmlns:r="http://schemas.openxmlformats.org/officeDocument/2006/relationships" xmlns:p="http://schemas.openxmlformats.org/presentationml/2006/main">
+  <p:cSld>
+    <p:spTree>
+      <p:nvGrpSpPr>
+        <p:cNvPr id="1" name=""/>
+        <p:cNvGrpSpPr/>
+        <p:nvPr/>
+      </p:nvGrpSpPr>
+      <p:grpSpPr>
+        <a:xfrm>
+          <a:off x="0" y="0"/>
+          <a:ext cx="0" cy="0"/>
+          <a:chOff x="0" y="0"/>
+          <a:chExt cx="0" cy="0"/>
+        </a:xfrm>
+      </p:grpSpPr>
+      <p:sp>
+        <p:nvSpPr>
+          <p:cNvPr id="2" name="Rectángulo 1"/>
+          <p:cNvSpPr/>
+          <p:nvPr/>
+        </p:nvSpPr>
+        <p:spPr>
+          <a:xfrm>
+            <a:off x="577636" y="363111"/>
+            <a:ext cx="7523085" cy="707886"/>
+          </a:xfrm>
+          <a:prstGeom prst="rect">
+            <a:avLst/>
+          </a:prstGeom>
+        </p:spPr>
+        <p:txBody>
+          <a:bodyPr wrap="none">
+            <a:spAutoFit/>
+          </a:bodyPr>
+          <a:lstStyle/>
+          <a:p>
+            <a:r>
+              <a:rPr lang="es-ES_tradnl" sz="4000" smtClean="0"/>
+              <a:t>spfx</a:t>
+            </a:r>
+            <a:r>
+              <a:rPr lang="es-ES_tradnl" sz="4000" dirty="0" smtClean="0"/>
+              <a:t> </a:t>
+            </a:r>
+            <a:r>
+              <a:rPr lang="es-ES_tradnl" sz="4000" dirty="0" err="1" smtClean="0"/>
+              <a:t>project</a:t>
+            </a:r>
+            <a:r>
+              <a:rPr lang="es-ES_tradnl" sz="4000" dirty="0" smtClean="0"/>
+              <a:t> </a:t>
+            </a:r>
+            <a:r>
+              <a:rPr lang="es-ES_tradnl" sz="4000" dirty="0" err="1" smtClean="0"/>
+              <a:t>anatomy</a:t>
+            </a:r>
+            <a:r>
+              <a:rPr lang="es-ES_tradnl" sz="4000" dirty="0" smtClean="0"/>
+              <a:t> and </a:t>
+            </a:r>
+            <a:r>
+              <a:rPr lang="es-ES_tradnl" sz="4000" dirty="0" err="1" smtClean="0"/>
+              <a:t>toolchain</a:t>
+            </a:r>
+            <a:endParaRPr lang="es-ES_tradnl" sz="4000" dirty="0"/>
+          </a:p>
+        </p:txBody>
+      </p:sp>
+      <p:sp>
+        <p:nvSpPr>
+          <p:cNvPr id="3" name="CuadroTexto 2"/>
+          <p:cNvSpPr txBox="1"/>
+          <p:nvPr/>
+        </p:nvSpPr>
+        <p:spPr>
+          <a:xfrm>
+            <a:off x="1690777" y="1570008"/>
+            <a:ext cx="4796287" cy="1200329"/>
+          </a:xfrm>
+          <a:prstGeom prst="rect">
+            <a:avLst/>
+          </a:prstGeom>
+          <a:noFill/>
+        </p:spPr>
+        <p:txBody>
+          <a:bodyPr wrap="square" rtlCol="0">
+            <a:spAutoFit/>
+          </a:bodyPr>
+          <a:lstStyle/>
+          <a:p>
+            <a:pPr marL="342900" indent="-342900">
+              <a:buFont typeface="+mj-lt"/>
+              <a:buAutoNum type="arabicPeriod"/>
+            </a:pPr>
+            <a:r>
+              <a:rPr lang="es-ES_tradnl" dirty="0" err="1" smtClean="0"/>
+              <a:t>Create</a:t>
+            </a:r>
+            <a:r>
+              <a:rPr lang="es-ES_tradnl" dirty="0" smtClean="0"/>
+              <a:t> </a:t>
+            </a:r>
+            <a:r>
+              <a:rPr lang="es-ES_tradnl" dirty="0" err="1" smtClean="0"/>
+              <a:t>project</a:t>
+            </a:r>
+            <a:r>
+              <a:rPr lang="es-ES_tradnl" dirty="0" smtClean="0"/>
+              <a:t> </a:t>
+            </a:r>
+            <a:r>
+              <a:rPr lang="es-ES_tradnl" dirty="0" err="1" smtClean="0"/>
+              <a:t>using</a:t>
+            </a:r>
+            <a:r>
+              <a:rPr lang="es-ES_tradnl" dirty="0" smtClean="0"/>
+              <a:t> </a:t>
+            </a:r>
+            <a:r>
+              <a:rPr lang="es-ES_tradnl" dirty="0" err="1" smtClean="0"/>
+              <a:t>yeoman</a:t>
+            </a:r>
+            <a:r>
+              <a:rPr lang="es-ES_tradnl" dirty="0" smtClean="0"/>
+              <a:t> </a:t>
+            </a:r>
+            <a:r>
+              <a:rPr lang="es-ES_tradnl" dirty="0" err="1" smtClean="0"/>
+              <a:t>template</a:t>
+            </a:r>
+            <a:r>
+              <a:rPr lang="es-ES_tradnl" dirty="0" smtClean="0"/>
+              <a:t> </a:t>
+            </a:r>
+            <a:r>
+              <a:rPr lang="es-ES_tradnl" dirty="0" err="1" smtClean="0"/>
+              <a:t>with</a:t>
+            </a:r>
+            <a:r>
+              <a:rPr lang="es-ES_tradnl" dirty="0" smtClean="0"/>
+              <a:t> </a:t>
+            </a:r>
+            <a:r>
+              <a:rPr lang="es-ES_tradnl" dirty="0" err="1" smtClean="0"/>
+              <a:t>the</a:t>
+            </a:r>
+            <a:r>
+              <a:rPr lang="es-ES_tradnl" dirty="0" smtClean="0"/>
+              <a:t> </a:t>
+            </a:r>
+            <a:r>
+              <a:rPr lang="mr-IN" dirty="0" smtClean="0"/>
+              <a:t>–</a:t>
+            </a:r>
+            <a:r>
+              <a:rPr lang="es-ES_tradnl" dirty="0" err="1" smtClean="0"/>
+              <a:t>skip-install</a:t>
+            </a:r>
+            <a:r>
+              <a:rPr lang="es-ES_tradnl" dirty="0" smtClean="0"/>
+              <a:t> </a:t>
+            </a:r>
+            <a:r>
+              <a:rPr lang="es-ES_tradnl" dirty="0" err="1" smtClean="0"/>
+              <a:t>option</a:t>
+            </a:r>
+            <a:endParaRPr lang="es-ES_tradnl" dirty="0" smtClean="0"/>
+          </a:p>
+          <a:p>
+            <a:pPr marL="342900" indent="-342900">
+              <a:buFont typeface="+mj-lt"/>
+              <a:buAutoNum type="arabicPeriod"/>
+            </a:pPr>
+            <a:r>
+              <a:rPr lang="es-ES_tradnl" dirty="0" smtClean="0"/>
+              <a:t>Quick </a:t>
+            </a:r>
+            <a:r>
+              <a:rPr lang="es-ES_tradnl" dirty="0" err="1" smtClean="0"/>
+              <a:t>comment</a:t>
+            </a:r>
+            <a:r>
+              <a:rPr lang="es-ES_tradnl" dirty="0" smtClean="0"/>
+              <a:t> </a:t>
+            </a:r>
+            <a:r>
+              <a:rPr lang="es-ES_tradnl" dirty="0" err="1" smtClean="0"/>
+              <a:t>about</a:t>
+            </a:r>
+            <a:r>
+              <a:rPr lang="es-ES_tradnl" dirty="0" smtClean="0"/>
+              <a:t> </a:t>
+            </a:r>
+            <a:r>
+              <a:rPr lang="es-ES_tradnl" dirty="0" err="1" smtClean="0"/>
+              <a:t>the</a:t>
+            </a:r>
+            <a:r>
+              <a:rPr lang="es-ES_tradnl" dirty="0" smtClean="0"/>
+              <a:t> </a:t>
+            </a:r>
+            <a:r>
+              <a:rPr lang="es-ES_tradnl" dirty="0" err="1" smtClean="0"/>
+              <a:t>toolchain</a:t>
+            </a:r>
+            <a:r>
+              <a:rPr lang="es-ES_tradnl" dirty="0" smtClean="0"/>
+              <a:t> and </a:t>
+            </a:r>
+            <a:r>
+              <a:rPr lang="es-ES_tradnl" dirty="0" err="1" smtClean="0"/>
+              <a:t>the</a:t>
+            </a:r>
+            <a:r>
+              <a:rPr lang="es-ES_tradnl" dirty="0" smtClean="0"/>
+              <a:t> </a:t>
+            </a:r>
+            <a:r>
+              <a:rPr lang="es-ES_tradnl" dirty="0" err="1" smtClean="0"/>
+              <a:t>different</a:t>
+            </a:r>
+            <a:r>
+              <a:rPr lang="es-ES_tradnl" dirty="0" smtClean="0"/>
+              <a:t> files </a:t>
+            </a:r>
+            <a:r>
+              <a:rPr lang="es-ES_tradnl" smtClean="0"/>
+              <a:t>generated</a:t>
+            </a:r>
+            <a:endParaRPr lang="es-ES_tradnl"/>
+          </a:p>
+        </p:txBody>
+      </p:sp>
+    </p:spTree>
+    <p:extLst>
+      <p:ext uri="{BB962C8B-B14F-4D97-AF65-F5344CB8AC3E}">
+        <p14:creationId xmlns:p14="http://schemas.microsoft.com/office/powerpoint/2010/main" val="317171633"/>
+      </p:ext>
+    </p:extLst>
+  </p:cSld>
+  <p:clrMapOvr>
+    <a:masterClrMapping/>
+  </p:clrMapOvr>
+  <p:timing>
+    <p:tnLst>
+      <p:par>
+        <p:cTn id="1" dur="indefinite" restart="never" nodeType="tmRoot"/>
+      </p:par>
+    </p:tnLst>
+  </p:timing>
 </p:sld>
 </file>
 
@@ -3354,4 +5568,265 @@
     </a:ext>
   </a:extLst>
 </a:theme>
+</file>
+
+<file path=ppt/theme/theme2.xml><?xml version="1.0" encoding="utf-8"?>
+<a:theme xmlns:a="http://schemas.openxmlformats.org/drawingml/2006/main" name="Tema de Office">
+  <a:themeElements>
+    <a:clrScheme name="Office">
+      <a:dk1>
+        <a:sysClr val="windowText" lastClr="000000"/>
+      </a:dk1>
+      <a:lt1>
+        <a:sysClr val="window" lastClr="FFFFFF"/>
+      </a:lt1>
+      <a:dk2>
+        <a:srgbClr val="44546A"/>
+      </a:dk2>
+      <a:lt2>
+        <a:srgbClr val="E7E6E6"/>
+      </a:lt2>
+      <a:accent1>
+        <a:srgbClr val="4472C4"/>
+      </a:accent1>
+      <a:accent2>
+        <a:srgbClr val="ED7D31"/>
+      </a:accent2>
+      <a:accent3>
+        <a:srgbClr val="A5A5A5"/>
+      </a:accent3>
+      <a:accent4>
+        <a:srgbClr val="FFC000"/>
+      </a:accent4>
+      <a:accent5>
+        <a:srgbClr val="5B9BD5"/>
+      </a:accent5>
+      <a:accent6>
+        <a:srgbClr val="70AD47"/>
+      </a:accent6>
+      <a:hlink>
+        <a:srgbClr val="0563C1"/>
+      </a:hlink>
+      <a:folHlink>
+        <a:srgbClr val="954F72"/>
+      </a:folHlink>
+    </a:clrScheme>
+    <a:fontScheme name="Office">
+      <a:majorFont>
+        <a:latin typeface="Calibri Light" panose="020F0302020204030204"/>
+        <a:ea typeface=""/>
+        <a:cs typeface=""/>
+        <a:font script="Jpan" typeface="Yu Gothic Light"/>
+        <a:font script="Hang" typeface="맑은 고딕"/>
+        <a:font script="Hans" typeface="DengXian Light"/>
+        <a:font script="Hant" typeface="新細明體"/>
+        <a:font script="Arab" typeface="Times New Roman"/>
+        <a:font script="Hebr" typeface="Times New Roman"/>
+        <a:font script="Thai" typeface="Angsana New"/>
+        <a:font script="Ethi" typeface="Nyala"/>
+        <a:font script="Beng" typeface="Vrinda"/>
+        <a:font script="Gujr" typeface="Shruti"/>
+        <a:font script="Khmr" typeface="MoolBoran"/>
+        <a:font script="Knda" typeface="Tunga"/>
+        <a:font script="Guru" typeface="Raavi"/>
+        <a:font script="Cans" typeface="Euphemia"/>
+        <a:font script="Cher" typeface="Plantagenet Cherokee"/>
+        <a:font script="Yiii" typeface="Microsoft Yi Baiti"/>
+        <a:font script="Tibt" typeface="Microsoft Himalaya"/>
+        <a:font script="Thaa" typeface="MV Boli"/>
+        <a:font script="Deva" typeface="Mangal"/>
+        <a:font script="Telu" typeface="Gautami"/>
+        <a:font script="Taml" typeface="Latha"/>
+        <a:font script="Syrc" typeface="Estrangelo Edessa"/>
+        <a:font script="Orya" typeface="Kalinga"/>
+        <a:font script="Mlym" typeface="Kartika"/>
+        <a:font script="Laoo" typeface="DokChampa"/>
+        <a:font script="Sinh" typeface="Iskoola Pota"/>
+        <a:font script="Mong" typeface="Mongolian Baiti"/>
+        <a:font script="Viet" typeface="Times New Roman"/>
+        <a:font script="Uigh" typeface="Microsoft Uighur"/>
+        <a:font script="Geor" typeface="Sylfaen"/>
+      </a:majorFont>
+      <a:minorFont>
+        <a:latin typeface="Calibri" panose="020F0502020204030204"/>
+        <a:ea typeface=""/>
+        <a:cs typeface=""/>
+        <a:font script="Jpan" typeface="Yu Gothic"/>
+        <a:font script="Hang" typeface="맑은 고딕"/>
+        <a:font script="Hans" typeface="DengXian"/>
+        <a:font script="Hant" typeface="新細明體"/>
+        <a:font script="Arab" typeface="Arial"/>
+        <a:font script="Hebr" typeface="Arial"/>
+        <a:font script="Thai" typeface="Cordia New"/>
+        <a:font script="Ethi" typeface="Nyala"/>
+        <a:font script="Beng" typeface="Vrinda"/>
+        <a:font script="Gujr" typeface="Shruti"/>
+        <a:font script="Khmr" typeface="DaunPenh"/>
+        <a:font script="Knda" typeface="Tunga"/>
+        <a:font script="Guru" typeface="Raavi"/>
+        <a:font script="Cans" typeface="Euphemia"/>
+        <a:font script="Cher" typeface="Plantagenet Cherokee"/>
+        <a:font script="Yiii" typeface="Microsoft Yi Baiti"/>
+        <a:font script="Tibt" typeface="Microsoft Himalaya"/>
+        <a:font script="Thaa" typeface="MV Boli"/>
+        <a:font script="Deva" typeface="Mangal"/>
+        <a:font script="Telu" typeface="Gautami"/>
+        <a:font script="Taml" typeface="Latha"/>
+        <a:font script="Syrc" typeface="Estrangelo Edessa"/>
+        <a:font script="Orya" typeface="Kalinga"/>
+        <a:font script="Mlym" typeface="Kartika"/>
+        <a:font script="Laoo" typeface="DokChampa"/>
+        <a:font script="Sinh" typeface="Iskoola Pota"/>
+        <a:font script="Mong" typeface="Mongolian Baiti"/>
+        <a:font script="Viet" typeface="Arial"/>
+        <a:font script="Uigh" typeface="Microsoft Uighur"/>
+        <a:font script="Geor" typeface="Sylfaen"/>
+      </a:minorFont>
+    </a:fontScheme>
+    <a:fmtScheme name="Office">
+      <a:fillStyleLst>
+        <a:solidFill>
+          <a:schemeClr val="phClr"/>
+        </a:solidFill>
+        <a:gradFill rotWithShape="1">
+          <a:gsLst>
+            <a:gs pos="0">
+              <a:schemeClr val="phClr">
+                <a:lumMod val="110000"/>
+                <a:satMod val="105000"/>
+                <a:tint val="67000"/>
+              </a:schemeClr>
+            </a:gs>
+            <a:gs pos="50000">
+              <a:schemeClr val="phClr">
+                <a:lumMod val="105000"/>
+                <a:satMod val="103000"/>
+                <a:tint val="73000"/>
+              </a:schemeClr>
+            </a:gs>
+            <a:gs pos="100000">
+              <a:schemeClr val="phClr">
+                <a:lumMod val="105000"/>
+                <a:satMod val="109000"/>
+                <a:tint val="81000"/>
+              </a:schemeClr>
+            </a:gs>
+          </a:gsLst>
+          <a:lin ang="5400000" scaled="0"/>
+        </a:gradFill>
+        <a:gradFill rotWithShape="1">
+          <a:gsLst>
+            <a:gs pos="0">
+              <a:schemeClr val="phClr">
+                <a:satMod val="103000"/>
+                <a:lumMod val="102000"/>
+                <a:tint val="94000"/>
+              </a:schemeClr>
+            </a:gs>
+            <a:gs pos="50000">
+              <a:schemeClr val="phClr">
+                <a:satMod val="110000"/>
+                <a:lumMod val="100000"/>
+                <a:shade val="100000"/>
+              </a:schemeClr>
+            </a:gs>
+            <a:gs pos="100000">
+              <a:schemeClr val="phClr">
+                <a:lumMod val="99000"/>
+                <a:satMod val="120000"/>
+                <a:shade val="78000"/>
+              </a:schemeClr>
+            </a:gs>
+          </a:gsLst>
+          <a:lin ang="5400000" scaled="0"/>
+        </a:gradFill>
+      </a:fillStyleLst>
+      <a:lnStyleLst>
+        <a:ln w="6350" cap="flat" cmpd="sng" algn="ctr">
+          <a:solidFill>
+            <a:schemeClr val="phClr"/>
+          </a:solidFill>
+          <a:prstDash val="solid"/>
+          <a:miter lim="800000"/>
+        </a:ln>
+        <a:ln w="12700" cap="flat" cmpd="sng" algn="ctr">
+          <a:solidFill>
+            <a:schemeClr val="phClr"/>
+          </a:solidFill>
+          <a:prstDash val="solid"/>
+          <a:miter lim="800000"/>
+        </a:ln>
+        <a:ln w="19050" cap="flat" cmpd="sng" algn="ctr">
+          <a:solidFill>
+            <a:schemeClr val="phClr"/>
+          </a:solidFill>
+          <a:prstDash val="solid"/>
+          <a:miter lim="800000"/>
+        </a:ln>
+      </a:lnStyleLst>
+      <a:effectStyleLst>
+        <a:effectStyle>
+          <a:effectLst/>
+        </a:effectStyle>
+        <a:effectStyle>
+          <a:effectLst/>
+        </a:effectStyle>
+        <a:effectStyle>
+          <a:effectLst>
+            <a:outerShdw blurRad="57150" dist="19050" dir="5400000" algn="ctr" rotWithShape="0">
+              <a:srgbClr val="000000">
+                <a:alpha val="63000"/>
+              </a:srgbClr>
+            </a:outerShdw>
+          </a:effectLst>
+        </a:effectStyle>
+      </a:effectStyleLst>
+      <a:bgFillStyleLst>
+        <a:solidFill>
+          <a:schemeClr val="phClr"/>
+        </a:solidFill>
+        <a:solidFill>
+          <a:schemeClr val="phClr">
+            <a:tint val="95000"/>
+            <a:satMod val="170000"/>
+          </a:schemeClr>
+        </a:solidFill>
+        <a:gradFill rotWithShape="1">
+          <a:gsLst>
+            <a:gs pos="0">
+              <a:schemeClr val="phClr">
+                <a:tint val="93000"/>
+                <a:satMod val="150000"/>
+                <a:shade val="98000"/>
+                <a:lumMod val="102000"/>
+              </a:schemeClr>
+            </a:gs>
+            <a:gs pos="50000">
+              <a:schemeClr val="phClr">
+                <a:tint val="98000"/>
+                <a:satMod val="130000"/>
+                <a:shade val="90000"/>
+                <a:lumMod val="103000"/>
+              </a:schemeClr>
+            </a:gs>
+            <a:gs pos="100000">
+              <a:schemeClr val="phClr">
+                <a:shade val="63000"/>
+                <a:satMod val="120000"/>
+              </a:schemeClr>
+            </a:gs>
+          </a:gsLst>
+          <a:lin ang="5400000" scaled="0"/>
+        </a:gradFill>
+      </a:bgFillStyleLst>
+    </a:fmtScheme>
+  </a:themeElements>
+  <a:objectDefaults/>
+  <a:extraClrSchemeLst/>
+  <a:extLst>
+    <a:ext uri="{05A4C25C-085E-4340-85A3-A5531E510DB2}">
+      <thm15:themeFamily xmlns:thm15="http://schemas.microsoft.com/office/thememl/2012/main" name="Office Theme" id="{62F939B6-93AF-4DB8-9C6B-D6C7DFDC589F}" vid="{4A3C46E8-61CC-4603-A589-7422A47A8E4A}"/>
+    </a:ext>
+  </a:extLst>
+</a:theme>
 </file>
</xml_diff>